<commit_message>
Shell Scripting part over
</commit_message>
<xml_diff>
--- a/Generating Report from CSV file using Shell Scripting.pptx
+++ b/Generating Report from CSV file using Shell Scripting.pptx
@@ -5,7 +5,7 @@
     <p:sldMasterId id="2147483648" r:id="rId1"/>
   </p:sldMasterIdLst>
   <p:notesMasterIdLst>
-    <p:notesMasterId r:id="rId55"/>
+    <p:notesMasterId r:id="rId56"/>
   </p:notesMasterIdLst>
   <p:sldIdLst>
     <p:sldId id="256" r:id="rId2"/>
@@ -21,46 +21,47 @@
     <p:sldId id="306" r:id="rId12"/>
     <p:sldId id="307" r:id="rId13"/>
     <p:sldId id="308" r:id="rId14"/>
-    <p:sldId id="273" r:id="rId15"/>
-    <p:sldId id="257" r:id="rId16"/>
-    <p:sldId id="258" r:id="rId17"/>
-    <p:sldId id="259" r:id="rId18"/>
-    <p:sldId id="260" r:id="rId19"/>
-    <p:sldId id="261" r:id="rId20"/>
-    <p:sldId id="262" r:id="rId21"/>
-    <p:sldId id="264" r:id="rId22"/>
-    <p:sldId id="263" r:id="rId23"/>
-    <p:sldId id="265" r:id="rId24"/>
-    <p:sldId id="266" r:id="rId25"/>
-    <p:sldId id="277" r:id="rId26"/>
-    <p:sldId id="278" r:id="rId27"/>
-    <p:sldId id="279" r:id="rId28"/>
-    <p:sldId id="280" r:id="rId29"/>
-    <p:sldId id="281" r:id="rId30"/>
-    <p:sldId id="282" r:id="rId31"/>
-    <p:sldId id="283" r:id="rId32"/>
-    <p:sldId id="284" r:id="rId33"/>
-    <p:sldId id="286" r:id="rId34"/>
-    <p:sldId id="285" r:id="rId35"/>
-    <p:sldId id="287" r:id="rId36"/>
-    <p:sldId id="288" r:id="rId37"/>
-    <p:sldId id="289" r:id="rId38"/>
-    <p:sldId id="290" r:id="rId39"/>
-    <p:sldId id="291" r:id="rId40"/>
-    <p:sldId id="292" r:id="rId41"/>
-    <p:sldId id="293" r:id="rId42"/>
-    <p:sldId id="294" r:id="rId43"/>
-    <p:sldId id="295" r:id="rId44"/>
-    <p:sldId id="296" r:id="rId45"/>
-    <p:sldId id="297" r:id="rId46"/>
-    <p:sldId id="298" r:id="rId47"/>
-    <p:sldId id="299" r:id="rId48"/>
-    <p:sldId id="267" r:id="rId49"/>
-    <p:sldId id="268" r:id="rId50"/>
-    <p:sldId id="270" r:id="rId51"/>
-    <p:sldId id="271" r:id="rId52"/>
-    <p:sldId id="272" r:id="rId53"/>
-    <p:sldId id="269" r:id="rId54"/>
+    <p:sldId id="309" r:id="rId15"/>
+    <p:sldId id="273" r:id="rId16"/>
+    <p:sldId id="257" r:id="rId17"/>
+    <p:sldId id="258" r:id="rId18"/>
+    <p:sldId id="259" r:id="rId19"/>
+    <p:sldId id="260" r:id="rId20"/>
+    <p:sldId id="261" r:id="rId21"/>
+    <p:sldId id="262" r:id="rId22"/>
+    <p:sldId id="264" r:id="rId23"/>
+    <p:sldId id="263" r:id="rId24"/>
+    <p:sldId id="265" r:id="rId25"/>
+    <p:sldId id="266" r:id="rId26"/>
+    <p:sldId id="277" r:id="rId27"/>
+    <p:sldId id="278" r:id="rId28"/>
+    <p:sldId id="279" r:id="rId29"/>
+    <p:sldId id="280" r:id="rId30"/>
+    <p:sldId id="281" r:id="rId31"/>
+    <p:sldId id="282" r:id="rId32"/>
+    <p:sldId id="283" r:id="rId33"/>
+    <p:sldId id="284" r:id="rId34"/>
+    <p:sldId id="286" r:id="rId35"/>
+    <p:sldId id="285" r:id="rId36"/>
+    <p:sldId id="287" r:id="rId37"/>
+    <p:sldId id="288" r:id="rId38"/>
+    <p:sldId id="289" r:id="rId39"/>
+    <p:sldId id="290" r:id="rId40"/>
+    <p:sldId id="291" r:id="rId41"/>
+    <p:sldId id="292" r:id="rId42"/>
+    <p:sldId id="293" r:id="rId43"/>
+    <p:sldId id="294" r:id="rId44"/>
+    <p:sldId id="295" r:id="rId45"/>
+    <p:sldId id="296" r:id="rId46"/>
+    <p:sldId id="297" r:id="rId47"/>
+    <p:sldId id="298" r:id="rId48"/>
+    <p:sldId id="299" r:id="rId49"/>
+    <p:sldId id="267" r:id="rId50"/>
+    <p:sldId id="268" r:id="rId51"/>
+    <p:sldId id="270" r:id="rId52"/>
+    <p:sldId id="271" r:id="rId53"/>
+    <p:sldId id="272" r:id="rId54"/>
+    <p:sldId id="269" r:id="rId55"/>
   </p:sldIdLst>
   <p:sldSz cx="12192000" cy="6858000"/>
   <p:notesSz cx="6858000" cy="9144000"/>
@@ -181,6 +182,7 @@
             <p14:sldId id="306"/>
             <p14:sldId id="307"/>
             <p14:sldId id="308"/>
+            <p14:sldId id="309"/>
           </p14:sldIdLst>
         </p14:section>
         <p14:section name="Parsing CSV Files" id="{72E6842A-0D21-4DCC-8736-42445B3A60A1}">
@@ -224,6 +226,10 @@
             <p14:sldId id="270"/>
             <p14:sldId id="271"/>
             <p14:sldId id="272"/>
+          </p14:sldIdLst>
+        </p14:section>
+        <p14:section name="Reuse" id="{09B48CB1-C627-49C3-80CA-9DE48825F830}">
+          <p14:sldIdLst>
             <p14:sldId id="269"/>
           </p14:sldIdLst>
         </p14:section>
@@ -651,7 +657,7 @@
           <a:p>
             <a:fld id="{35C839C2-5A1A-427D-B081-1A6065269FA1}" type="slidenum">
               <a:rPr lang="en-IN" smtClean="0"/>
-              <a:t>18</a:t>
+              <a:t>19</a:t>
             </a:fld>
             <a:endParaRPr lang="en-IN" dirty="0"/>
           </a:p>
@@ -735,7 +741,7 @@
           <a:p>
             <a:fld id="{35C839C2-5A1A-427D-B081-1A6065269FA1}" type="slidenum">
               <a:rPr lang="en-IN" smtClean="0"/>
-              <a:t>27</a:t>
+              <a:t>28</a:t>
             </a:fld>
             <a:endParaRPr lang="en-IN" dirty="0"/>
           </a:p>
@@ -819,7 +825,7 @@
           <a:p>
             <a:fld id="{35C839C2-5A1A-427D-B081-1A6065269FA1}" type="slidenum">
               <a:rPr lang="en-IN" smtClean="0"/>
-              <a:t>28</a:t>
+              <a:t>29</a:t>
             </a:fld>
             <a:endParaRPr lang="en-IN" dirty="0"/>
           </a:p>
@@ -903,7 +909,7 @@
           <a:p>
             <a:fld id="{35C839C2-5A1A-427D-B081-1A6065269FA1}" type="slidenum">
               <a:rPr lang="en-IN" smtClean="0"/>
-              <a:t>29</a:t>
+              <a:t>30</a:t>
             </a:fld>
             <a:endParaRPr lang="en-IN" dirty="0"/>
           </a:p>
@@ -987,7 +993,7 @@
           <a:p>
             <a:fld id="{35C839C2-5A1A-427D-B081-1A6065269FA1}" type="slidenum">
               <a:rPr lang="en-IN" smtClean="0"/>
-              <a:t>30</a:t>
+              <a:t>31</a:t>
             </a:fld>
             <a:endParaRPr lang="en-IN" dirty="0"/>
           </a:p>
@@ -1071,7 +1077,7 @@
           <a:p>
             <a:fld id="{35C839C2-5A1A-427D-B081-1A6065269FA1}" type="slidenum">
               <a:rPr lang="en-IN" smtClean="0"/>
-              <a:t>31</a:t>
+              <a:t>32</a:t>
             </a:fld>
             <a:endParaRPr lang="en-IN" dirty="0"/>
           </a:p>
@@ -1155,7 +1161,7 @@
           <a:p>
             <a:fld id="{35C839C2-5A1A-427D-B081-1A6065269FA1}" type="slidenum">
               <a:rPr lang="en-IN" smtClean="0"/>
-              <a:t>32</a:t>
+              <a:t>33</a:t>
             </a:fld>
             <a:endParaRPr lang="en-IN" dirty="0"/>
           </a:p>
@@ -1239,7 +1245,7 @@
           <a:p>
             <a:fld id="{35C839C2-5A1A-427D-B081-1A6065269FA1}" type="slidenum">
               <a:rPr lang="en-IN" smtClean="0"/>
-              <a:t>33</a:t>
+              <a:t>34</a:t>
             </a:fld>
             <a:endParaRPr lang="en-IN" dirty="0"/>
           </a:p>
@@ -1323,7 +1329,7 @@
           <a:p>
             <a:fld id="{35C839C2-5A1A-427D-B081-1A6065269FA1}" type="slidenum">
               <a:rPr lang="en-IN" smtClean="0"/>
-              <a:t>34</a:t>
+              <a:t>35</a:t>
             </a:fld>
             <a:endParaRPr lang="en-IN" dirty="0"/>
           </a:p>
@@ -1407,7 +1413,7 @@
           <a:p>
             <a:fld id="{35C839C2-5A1A-427D-B081-1A6065269FA1}" type="slidenum">
               <a:rPr lang="en-IN" smtClean="0"/>
-              <a:t>35</a:t>
+              <a:t>36</a:t>
             </a:fld>
             <a:endParaRPr lang="en-IN" dirty="0"/>
           </a:p>
@@ -1491,7 +1497,7 @@
           <a:p>
             <a:fld id="{35C839C2-5A1A-427D-B081-1A6065269FA1}" type="slidenum">
               <a:rPr lang="en-IN" smtClean="0"/>
-              <a:t>36</a:t>
+              <a:t>37</a:t>
             </a:fld>
             <a:endParaRPr lang="en-IN" dirty="0"/>
           </a:p>
@@ -1575,7 +1581,7 @@
           <a:p>
             <a:fld id="{35C839C2-5A1A-427D-B081-1A6065269FA1}" type="slidenum">
               <a:rPr lang="en-IN" smtClean="0"/>
-              <a:t>19</a:t>
+              <a:t>20</a:t>
             </a:fld>
             <a:endParaRPr lang="en-IN" dirty="0"/>
           </a:p>
@@ -1659,7 +1665,7 @@
           <a:p>
             <a:fld id="{35C839C2-5A1A-427D-B081-1A6065269FA1}" type="slidenum">
               <a:rPr lang="en-IN" smtClean="0"/>
-              <a:t>37</a:t>
+              <a:t>38</a:t>
             </a:fld>
             <a:endParaRPr lang="en-IN" dirty="0"/>
           </a:p>
@@ -1743,7 +1749,7 @@
           <a:p>
             <a:fld id="{35C839C2-5A1A-427D-B081-1A6065269FA1}" type="slidenum">
               <a:rPr lang="en-IN" smtClean="0"/>
-              <a:t>38</a:t>
+              <a:t>39</a:t>
             </a:fld>
             <a:endParaRPr lang="en-IN" dirty="0"/>
           </a:p>
@@ -1827,7 +1833,7 @@
           <a:p>
             <a:fld id="{35C839C2-5A1A-427D-B081-1A6065269FA1}" type="slidenum">
               <a:rPr lang="en-IN" smtClean="0"/>
-              <a:t>39</a:t>
+              <a:t>40</a:t>
             </a:fld>
             <a:endParaRPr lang="en-IN" dirty="0"/>
           </a:p>
@@ -1911,7 +1917,7 @@
           <a:p>
             <a:fld id="{35C839C2-5A1A-427D-B081-1A6065269FA1}" type="slidenum">
               <a:rPr lang="en-IN" smtClean="0"/>
-              <a:t>40</a:t>
+              <a:t>41</a:t>
             </a:fld>
             <a:endParaRPr lang="en-IN" dirty="0"/>
           </a:p>
@@ -1995,7 +2001,7 @@
           <a:p>
             <a:fld id="{35C839C2-5A1A-427D-B081-1A6065269FA1}" type="slidenum">
               <a:rPr lang="en-IN" smtClean="0"/>
-              <a:t>41</a:t>
+              <a:t>42</a:t>
             </a:fld>
             <a:endParaRPr lang="en-IN" dirty="0"/>
           </a:p>
@@ -2079,7 +2085,7 @@
           <a:p>
             <a:fld id="{35C839C2-5A1A-427D-B081-1A6065269FA1}" type="slidenum">
               <a:rPr lang="en-IN" smtClean="0"/>
-              <a:t>42</a:t>
+              <a:t>43</a:t>
             </a:fld>
             <a:endParaRPr lang="en-IN" dirty="0"/>
           </a:p>
@@ -2163,7 +2169,7 @@
           <a:p>
             <a:fld id="{35C839C2-5A1A-427D-B081-1A6065269FA1}" type="slidenum">
               <a:rPr lang="en-IN" smtClean="0"/>
-              <a:t>43</a:t>
+              <a:t>44</a:t>
             </a:fld>
             <a:endParaRPr lang="en-IN" dirty="0"/>
           </a:p>
@@ -2247,7 +2253,7 @@
           <a:p>
             <a:fld id="{35C839C2-5A1A-427D-B081-1A6065269FA1}" type="slidenum">
               <a:rPr lang="en-IN" smtClean="0"/>
-              <a:t>44</a:t>
+              <a:t>45</a:t>
             </a:fld>
             <a:endParaRPr lang="en-IN" dirty="0"/>
           </a:p>
@@ -2331,7 +2337,7 @@
           <a:p>
             <a:fld id="{35C839C2-5A1A-427D-B081-1A6065269FA1}" type="slidenum">
               <a:rPr lang="en-IN" smtClean="0"/>
-              <a:t>45</a:t>
+              <a:t>46</a:t>
             </a:fld>
             <a:endParaRPr lang="en-IN" dirty="0"/>
           </a:p>
@@ -2415,7 +2421,7 @@
           <a:p>
             <a:fld id="{35C839C2-5A1A-427D-B081-1A6065269FA1}" type="slidenum">
               <a:rPr lang="en-IN" smtClean="0"/>
-              <a:t>46</a:t>
+              <a:t>47</a:t>
             </a:fld>
             <a:endParaRPr lang="en-IN" dirty="0"/>
           </a:p>
@@ -2499,7 +2505,7 @@
           <a:p>
             <a:fld id="{35C839C2-5A1A-427D-B081-1A6065269FA1}" type="slidenum">
               <a:rPr lang="en-IN" smtClean="0"/>
-              <a:t>20</a:t>
+              <a:t>21</a:t>
             </a:fld>
             <a:endParaRPr lang="en-IN" dirty="0"/>
           </a:p>
@@ -2583,7 +2589,7 @@
           <a:p>
             <a:fld id="{35C839C2-5A1A-427D-B081-1A6065269FA1}" type="slidenum">
               <a:rPr lang="en-IN" smtClean="0"/>
-              <a:t>47</a:t>
+              <a:t>48</a:t>
             </a:fld>
             <a:endParaRPr lang="en-IN" dirty="0"/>
           </a:p>
@@ -2667,7 +2673,7 @@
           <a:p>
             <a:fld id="{35C839C2-5A1A-427D-B081-1A6065269FA1}" type="slidenum">
               <a:rPr lang="en-IN" smtClean="0"/>
-              <a:t>48</a:t>
+              <a:t>49</a:t>
             </a:fld>
             <a:endParaRPr lang="en-IN" dirty="0"/>
           </a:p>
@@ -2751,7 +2757,7 @@
           <a:p>
             <a:fld id="{35C839C2-5A1A-427D-B081-1A6065269FA1}" type="slidenum">
               <a:rPr lang="en-IN" smtClean="0"/>
-              <a:t>49</a:t>
+              <a:t>50</a:t>
             </a:fld>
             <a:endParaRPr lang="en-IN" dirty="0"/>
           </a:p>
@@ -2835,7 +2841,7 @@
           <a:p>
             <a:fld id="{35C839C2-5A1A-427D-B081-1A6065269FA1}" type="slidenum">
               <a:rPr lang="en-IN" smtClean="0"/>
-              <a:t>50</a:t>
+              <a:t>51</a:t>
             </a:fld>
             <a:endParaRPr lang="en-IN" dirty="0"/>
           </a:p>
@@ -2919,7 +2925,7 @@
           <a:p>
             <a:fld id="{35C839C2-5A1A-427D-B081-1A6065269FA1}" type="slidenum">
               <a:rPr lang="en-IN" smtClean="0"/>
-              <a:t>51</a:t>
+              <a:t>52</a:t>
             </a:fld>
             <a:endParaRPr lang="en-IN" dirty="0"/>
           </a:p>
@@ -3003,7 +3009,7 @@
           <a:p>
             <a:fld id="{35C839C2-5A1A-427D-B081-1A6065269FA1}" type="slidenum">
               <a:rPr lang="en-IN" smtClean="0"/>
-              <a:t>52</a:t>
+              <a:t>53</a:t>
             </a:fld>
             <a:endParaRPr lang="en-IN" dirty="0"/>
           </a:p>
@@ -3087,7 +3093,7 @@
           <a:p>
             <a:fld id="{35C839C2-5A1A-427D-B081-1A6065269FA1}" type="slidenum">
               <a:rPr lang="en-IN" smtClean="0"/>
-              <a:t>21</a:t>
+              <a:t>22</a:t>
             </a:fld>
             <a:endParaRPr lang="en-IN" dirty="0"/>
           </a:p>
@@ -3171,7 +3177,7 @@
           <a:p>
             <a:fld id="{35C839C2-5A1A-427D-B081-1A6065269FA1}" type="slidenum">
               <a:rPr lang="en-IN" smtClean="0"/>
-              <a:t>22</a:t>
+              <a:t>23</a:t>
             </a:fld>
             <a:endParaRPr lang="en-IN" dirty="0"/>
           </a:p>
@@ -3255,7 +3261,7 @@
           <a:p>
             <a:fld id="{35C839C2-5A1A-427D-B081-1A6065269FA1}" type="slidenum">
               <a:rPr lang="en-IN" smtClean="0"/>
-              <a:t>23</a:t>
+              <a:t>24</a:t>
             </a:fld>
             <a:endParaRPr lang="en-IN" dirty="0"/>
           </a:p>
@@ -3339,7 +3345,7 @@
           <a:p>
             <a:fld id="{35C839C2-5A1A-427D-B081-1A6065269FA1}" type="slidenum">
               <a:rPr lang="en-IN" smtClean="0"/>
-              <a:t>24</a:t>
+              <a:t>25</a:t>
             </a:fld>
             <a:endParaRPr lang="en-IN" dirty="0"/>
           </a:p>
@@ -3423,7 +3429,7 @@
           <a:p>
             <a:fld id="{35C839C2-5A1A-427D-B081-1A6065269FA1}" type="slidenum">
               <a:rPr lang="en-IN" smtClean="0"/>
-              <a:t>25</a:t>
+              <a:t>26</a:t>
             </a:fld>
             <a:endParaRPr lang="en-IN" dirty="0"/>
           </a:p>
@@ -3507,7 +3513,7 @@
           <a:p>
             <a:fld id="{35C839C2-5A1A-427D-B081-1A6065269FA1}" type="slidenum">
               <a:rPr lang="en-IN" smtClean="0"/>
-              <a:t>26</a:t>
+              <a:t>27</a:t>
             </a:fld>
             <a:endParaRPr lang="en-IN" dirty="0"/>
           </a:p>
@@ -8454,6 +8460,441 @@
           </a:blip>
           <a:srcRect/>
           <a:stretch>
+            <a:fillRect t="-9000" b="-9000"/>
+          </a:stretch>
+        </a:blipFill>
+        <a:effectLst/>
+      </p:bgPr>
+    </p:bg>
+    <p:spTree>
+      <p:nvGrpSpPr>
+        <p:cNvPr id="1" name=""/>
+        <p:cNvGrpSpPr/>
+        <p:nvPr/>
+      </p:nvGrpSpPr>
+      <p:grpSpPr>
+        <a:xfrm>
+          <a:off x="0" y="0"/>
+          <a:ext cx="0" cy="0"/>
+          <a:chOff x="0" y="0"/>
+          <a:chExt cx="0" cy="0"/>
+        </a:xfrm>
+      </p:grpSpPr>
+      <p:sp>
+        <p:nvSpPr>
+          <p:cNvPr id="12" name="Rectangle 11">
+            <a:extLst>
+              <a:ext uri="{FF2B5EF4-FFF2-40B4-BE49-F238E27FC236}">
+                <a16:creationId xmlns:a16="http://schemas.microsoft.com/office/drawing/2014/main" id="{B808ECDE-BAA4-6E1D-DF96-995CEEBAFE1F}"/>
+              </a:ext>
+            </a:extLst>
+          </p:cNvPr>
+          <p:cNvSpPr/>
+          <p:nvPr/>
+        </p:nvSpPr>
+        <p:spPr>
+          <a:xfrm>
+            <a:off x="208572" y="192536"/>
+            <a:ext cx="11573119" cy="769441"/>
+          </a:xfrm>
+          <a:prstGeom prst="rect">
+            <a:avLst/>
+          </a:prstGeom>
+          <a:noFill/>
+        </p:spPr>
+        <p:txBody>
+          <a:bodyPr wrap="square" lIns="91440" tIns="45720" rIns="91440" bIns="45720">
+            <a:spAutoFit/>
+          </a:bodyPr>
+          <a:lstStyle/>
+          <a:p>
+            <a:r>
+              <a:rPr lang="en-US" sz="4400" dirty="0">
+                <a:ln w="0"/>
+                <a:effectLst>
+                  <a:outerShdw blurRad="38100" dist="19050" dir="2700000" algn="tl" rotWithShape="0">
+                    <a:schemeClr val="dk1">
+                      <a:alpha val="40000"/>
+                    </a:schemeClr>
+                  </a:outerShdw>
+                </a:effectLst>
+                <a:latin typeface="Fira Code SemiBold" panose="020B0809050000020004" pitchFamily="49" charset="0"/>
+                <a:ea typeface="Fira Code SemiBold" panose="020B0809050000020004" pitchFamily="49" charset="0"/>
+              </a:rPr>
+              <a:t>Bash Arrays</a:t>
+            </a:r>
+            <a:endParaRPr lang="en-US" sz="4400" b="0" cap="none" spc="0" dirty="0">
+              <a:ln w="0"/>
+              <a:effectLst>
+                <a:outerShdw blurRad="38100" dist="19050" dir="2700000" algn="tl" rotWithShape="0">
+                  <a:schemeClr val="dk1">
+                    <a:alpha val="40000"/>
+                  </a:schemeClr>
+                </a:outerShdw>
+              </a:effectLst>
+              <a:latin typeface="Fira Code SemiBold" panose="020B0809050000020004" pitchFamily="49" charset="0"/>
+              <a:ea typeface="Fira Code SemiBold" panose="020B0809050000020004" pitchFamily="49" charset="0"/>
+            </a:endParaRPr>
+          </a:p>
+        </p:txBody>
+      </p:sp>
+      <p:grpSp>
+        <p:nvGrpSpPr>
+          <p:cNvPr id="8" name="Group 7">
+            <a:extLst>
+              <a:ext uri="{FF2B5EF4-FFF2-40B4-BE49-F238E27FC236}">
+                <a16:creationId xmlns:a16="http://schemas.microsoft.com/office/drawing/2014/main" id="{858A0E37-0D25-8681-88CA-5D7135910C27}"/>
+              </a:ext>
+            </a:extLst>
+          </p:cNvPr>
+          <p:cNvGrpSpPr/>
+          <p:nvPr/>
+        </p:nvGrpSpPr>
+        <p:grpSpPr>
+          <a:xfrm>
+            <a:off x="208572" y="192536"/>
+            <a:ext cx="9058404" cy="6322198"/>
+            <a:chOff x="208572" y="192536"/>
+            <a:chExt cx="9058404" cy="6322198"/>
+          </a:xfrm>
+          <a:effectLst>
+            <a:outerShdw blurRad="63500" sx="102000" sy="102000" algn="ctr" rotWithShape="0">
+              <a:prstClr val="black">
+                <a:alpha val="40000"/>
+              </a:prstClr>
+            </a:outerShdw>
+          </a:effectLst>
+        </p:grpSpPr>
+        <p:pic>
+          <p:nvPicPr>
+            <p:cNvPr id="5" name="Picture 4">
+              <a:extLst>
+                <a:ext uri="{FF2B5EF4-FFF2-40B4-BE49-F238E27FC236}">
+                  <a16:creationId xmlns:a16="http://schemas.microsoft.com/office/drawing/2014/main" id="{00F4B6F3-833F-B1D3-2675-7FF6CB4C2787}"/>
+                </a:ext>
+              </a:extLst>
+            </p:cNvPr>
+            <p:cNvPicPr>
+              <a:picLocks noChangeAspect="1"/>
+            </p:cNvPicPr>
+            <p:nvPr/>
+          </p:nvPicPr>
+          <p:blipFill>
+            <a:blip r:embed="rId3">
+              <a:extLst>
+                <a:ext uri="{28A0092B-C50C-407E-A947-70E740481C1C}">
+                  <a14:useLocalDpi xmlns:a14="http://schemas.microsoft.com/office/drawing/2010/main" val="0"/>
+                </a:ext>
+              </a:extLst>
+            </a:blip>
+            <a:stretch>
+              <a:fillRect/>
+            </a:stretch>
+          </p:blipFill>
+          <p:spPr>
+            <a:xfrm>
+              <a:off x="208572" y="1630192"/>
+              <a:ext cx="4685921" cy="4815726"/>
+            </a:xfrm>
+            <a:prstGeom prst="rect">
+              <a:avLst/>
+            </a:prstGeom>
+          </p:spPr>
+        </p:pic>
+        <p:pic>
+          <p:nvPicPr>
+            <p:cNvPr id="7" name="Picture 6">
+              <a:extLst>
+                <a:ext uri="{FF2B5EF4-FFF2-40B4-BE49-F238E27FC236}">
+                  <a16:creationId xmlns:a16="http://schemas.microsoft.com/office/drawing/2014/main" id="{0CB81523-A36B-56BA-14DB-07FC107D465F}"/>
+                </a:ext>
+              </a:extLst>
+            </p:cNvPr>
+            <p:cNvPicPr>
+              <a:picLocks noChangeAspect="1"/>
+            </p:cNvPicPr>
+            <p:nvPr/>
+          </p:nvPicPr>
+          <p:blipFill>
+            <a:blip r:embed="rId4">
+              <a:extLst>
+                <a:ext uri="{28A0092B-C50C-407E-A947-70E740481C1C}">
+                  <a14:useLocalDpi xmlns:a14="http://schemas.microsoft.com/office/drawing/2010/main" val="0"/>
+                </a:ext>
+              </a:extLst>
+            </a:blip>
+            <a:stretch>
+              <a:fillRect/>
+            </a:stretch>
+          </p:blipFill>
+          <p:spPr>
+            <a:xfrm>
+              <a:off x="3222810" y="192536"/>
+              <a:ext cx="6044166" cy="6322198"/>
+            </a:xfrm>
+            <a:prstGeom prst="rect">
+              <a:avLst/>
+            </a:prstGeom>
+          </p:spPr>
+        </p:pic>
+      </p:grpSp>
+      <p:pic>
+        <p:nvPicPr>
+          <p:cNvPr id="3" name="Picture 2">
+            <a:extLst>
+              <a:ext uri="{FF2B5EF4-FFF2-40B4-BE49-F238E27FC236}">
+                <a16:creationId xmlns:a16="http://schemas.microsoft.com/office/drawing/2014/main" id="{2989AB76-9421-628F-2FDA-4AB75980FC21}"/>
+              </a:ext>
+            </a:extLst>
+          </p:cNvPr>
+          <p:cNvPicPr>
+            <a:picLocks noChangeAspect="1"/>
+          </p:cNvPicPr>
+          <p:nvPr/>
+        </p:nvPicPr>
+        <p:blipFill>
+          <a:blip r:embed="rId5">
+            <a:extLst>
+              <a:ext uri="{28A0092B-C50C-407E-A947-70E740481C1C}">
+                <a14:useLocalDpi xmlns:a14="http://schemas.microsoft.com/office/drawing/2010/main" val="0"/>
+              </a:ext>
+            </a:extLst>
+          </a:blip>
+          <a:stretch>
+            <a:fillRect/>
+          </a:stretch>
+        </p:blipFill>
+        <p:spPr>
+          <a:xfrm>
+            <a:off x="8193026" y="3082254"/>
+            <a:ext cx="3790402" cy="2150325"/>
+          </a:xfrm>
+          <a:prstGeom prst="rect">
+            <a:avLst/>
+          </a:prstGeom>
+          <a:effectLst>
+            <a:outerShdw blurRad="63500" sx="102000" sy="102000" algn="ctr" rotWithShape="0">
+              <a:prstClr val="black">
+                <a:alpha val="40000"/>
+              </a:prstClr>
+            </a:outerShdw>
+          </a:effectLst>
+        </p:spPr>
+      </p:pic>
+      <p:sp>
+        <p:nvSpPr>
+          <p:cNvPr id="2" name="Rectangle 1">
+            <a:extLst>
+              <a:ext uri="{FF2B5EF4-FFF2-40B4-BE49-F238E27FC236}">
+                <a16:creationId xmlns:a16="http://schemas.microsoft.com/office/drawing/2014/main" id="{012E85F0-7A92-1789-6936-227DEFEBCFFC}"/>
+              </a:ext>
+            </a:extLst>
+          </p:cNvPr>
+          <p:cNvSpPr/>
+          <p:nvPr/>
+        </p:nvSpPr>
+        <p:spPr>
+          <a:xfrm>
+            <a:off x="0" y="0"/>
+            <a:ext cx="12192000" cy="6858000"/>
+          </a:xfrm>
+          <a:prstGeom prst="rect">
+            <a:avLst/>
+          </a:prstGeom>
+          <a:solidFill>
+            <a:schemeClr val="tx1">
+              <a:alpha val="66000"/>
+            </a:schemeClr>
+          </a:solidFill>
+          <a:ln>
+            <a:noFill/>
+          </a:ln>
+        </p:spPr>
+        <p:style>
+          <a:lnRef idx="2">
+            <a:schemeClr val="accent1">
+              <a:shade val="50000"/>
+            </a:schemeClr>
+          </a:lnRef>
+          <a:fillRef idx="1">
+            <a:schemeClr val="accent1"/>
+          </a:fillRef>
+          <a:effectRef idx="0">
+            <a:schemeClr val="accent1"/>
+          </a:effectRef>
+          <a:fontRef idx="minor">
+            <a:schemeClr val="lt1"/>
+          </a:fontRef>
+        </p:style>
+        <p:txBody>
+          <a:bodyPr rtlCol="0" anchor="ctr"/>
+          <a:lstStyle/>
+          <a:p>
+            <a:pPr algn="ctr"/>
+            <a:endParaRPr lang="en-IN" dirty="0"/>
+          </a:p>
+        </p:txBody>
+      </p:sp>
+      <p:sp>
+        <p:nvSpPr>
+          <p:cNvPr id="4" name="Rectangle 3">
+            <a:extLst>
+              <a:ext uri="{FF2B5EF4-FFF2-40B4-BE49-F238E27FC236}">
+                <a16:creationId xmlns:a16="http://schemas.microsoft.com/office/drawing/2014/main" id="{49844D8C-3CB2-379F-CE26-BACCE7107E32}"/>
+              </a:ext>
+            </a:extLst>
+          </p:cNvPr>
+          <p:cNvSpPr/>
+          <p:nvPr/>
+        </p:nvSpPr>
+        <p:spPr>
+          <a:xfrm>
+            <a:off x="418203" y="2367171"/>
+            <a:ext cx="11153855" cy="2123658"/>
+          </a:xfrm>
+          <a:prstGeom prst="rect">
+            <a:avLst/>
+          </a:prstGeom>
+          <a:noFill/>
+        </p:spPr>
+        <p:txBody>
+          <a:bodyPr wrap="square" lIns="91440" tIns="45720" rIns="91440" bIns="45720">
+            <a:spAutoFit/>
+          </a:bodyPr>
+          <a:lstStyle/>
+          <a:p>
+            <a:pPr algn="ctr"/>
+            <a:r>
+              <a:rPr lang="en-US" sz="4400" b="0" cap="none" spc="0" dirty="0">
+                <a:ln w="0"/>
+                <a:solidFill>
+                  <a:schemeClr val="bg1"/>
+                </a:solidFill>
+                <a:effectLst>
+                  <a:outerShdw blurRad="38100" dist="19050" dir="2700000" algn="tl" rotWithShape="0">
+                    <a:schemeClr val="dk1">
+                      <a:alpha val="40000"/>
+                    </a:schemeClr>
+                  </a:outerShdw>
+                </a:effectLst>
+                <a:latin typeface="Fira Code Retina" panose="020B0809050000020004" pitchFamily="49" charset="0"/>
+                <a:ea typeface="Fira Code Retina" panose="020B0809050000020004" pitchFamily="49" charset="0"/>
+              </a:rPr>
+              <a:t>Moving on to utilize Shell Scripting to read data from CSV files through Bash Terminal...</a:t>
+            </a:r>
+          </a:p>
+        </p:txBody>
+      </p:sp>
+    </p:spTree>
+    <p:extLst>
+      <p:ext uri="{BB962C8B-B14F-4D97-AF65-F5344CB8AC3E}">
+        <p14:creationId xmlns:p14="http://schemas.microsoft.com/office/powerpoint/2010/main" val="3383245820"/>
+      </p:ext>
+    </p:extLst>
+  </p:cSld>
+  <p:clrMapOvr>
+    <a:masterClrMapping/>
+  </p:clrMapOvr>
+  <p:transition>
+    <p:fade/>
+  </p:transition>
+  <p:timing>
+    <p:tnLst>
+      <p:par>
+        <p:cTn id="1" dur="indefinite" restart="never" nodeType="tmRoot">
+          <p:childTnLst>
+            <p:seq concurrent="1" nextAc="seek">
+              <p:cTn id="2" dur="indefinite" nodeType="mainSeq">
+                <p:childTnLst>
+                  <p:par>
+                    <p:cTn id="3" fill="hold">
+                      <p:stCondLst>
+                        <p:cond delay="indefinite"/>
+                      </p:stCondLst>
+                      <p:childTnLst>
+                        <p:par>
+                          <p:cTn id="4" fill="hold">
+                            <p:stCondLst>
+                              <p:cond delay="0"/>
+                            </p:stCondLst>
+                            <p:childTnLst>
+                              <p:par>
+                                <p:cTn id="5" presetID="10" presetClass="entr" presetSubtype="0" fill="hold" nodeType="clickEffect">
+                                  <p:stCondLst>
+                                    <p:cond delay="0"/>
+                                  </p:stCondLst>
+                                  <p:childTnLst>
+                                    <p:set>
+                                      <p:cBhvr>
+                                        <p:cTn id="6" dur="1" fill="hold">
+                                          <p:stCondLst>
+                                            <p:cond delay="0"/>
+                                          </p:stCondLst>
+                                        </p:cTn>
+                                        <p:tgtEl>
+                                          <p:spTgt spid="3"/>
+                                        </p:tgtEl>
+                                        <p:attrNameLst>
+                                          <p:attrName>style.visibility</p:attrName>
+                                        </p:attrNameLst>
+                                      </p:cBhvr>
+                                      <p:to>
+                                        <p:strVal val="visible"/>
+                                      </p:to>
+                                    </p:set>
+                                    <p:animEffect transition="in" filter="fade">
+                                      <p:cBhvr>
+                                        <p:cTn id="7" dur="500"/>
+                                        <p:tgtEl>
+                                          <p:spTgt spid="3"/>
+                                        </p:tgtEl>
+                                      </p:cBhvr>
+                                    </p:animEffect>
+                                  </p:childTnLst>
+                                </p:cTn>
+                              </p:par>
+                            </p:childTnLst>
+                          </p:cTn>
+                        </p:par>
+                      </p:childTnLst>
+                    </p:cTn>
+                  </p:par>
+                </p:childTnLst>
+              </p:cTn>
+              <p:prevCondLst>
+                <p:cond evt="onPrev" delay="0">
+                  <p:tgtEl>
+                    <p:sldTgt/>
+                  </p:tgtEl>
+                </p:cond>
+              </p:prevCondLst>
+              <p:nextCondLst>
+                <p:cond evt="onNext" delay="0">
+                  <p:tgtEl>
+                    <p:sldTgt/>
+                  </p:tgtEl>
+                </p:cond>
+              </p:nextCondLst>
+            </p:seq>
+          </p:childTnLst>
+        </p:cTn>
+      </p:par>
+    </p:tnLst>
+  </p:timing>
+</p:sld>
+</file>
+
+<file path=ppt/slides/slide15.xml><?xml version="1.0" encoding="utf-8"?>
+<p:sld xmlns:a="http://schemas.openxmlformats.org/drawingml/2006/main" xmlns:r="http://schemas.openxmlformats.org/officeDocument/2006/relationships" xmlns:p="http://schemas.openxmlformats.org/presentationml/2006/main">
+  <p:cSld>
+    <p:bg>
+      <p:bgPr>
+        <a:blipFill dpi="0" rotWithShape="1">
+          <a:blip r:embed="rId2">
+            <a:lum/>
+          </a:blip>
+          <a:srcRect/>
+          <a:stretch>
             <a:fillRect/>
           </a:stretch>
         </a:blipFill>
@@ -8597,7 +9038,7 @@
 </p:sld>
 </file>
 
-<file path=ppt/slides/slide15.xml><?xml version="1.0" encoding="utf-8"?>
+<file path=ppt/slides/slide16.xml><?xml version="1.0" encoding="utf-8"?>
 <p:sld xmlns:a="http://schemas.openxmlformats.org/drawingml/2006/main" xmlns:r="http://schemas.openxmlformats.org/officeDocument/2006/relationships" xmlns:p="http://schemas.openxmlformats.org/presentationml/2006/main">
   <p:cSld>
     <p:bg>
@@ -8766,7 +9207,7 @@
 </p:sld>
 </file>
 
-<file path=ppt/slides/slide16.xml><?xml version="1.0" encoding="utf-8"?>
+<file path=ppt/slides/slide17.xml><?xml version="1.0" encoding="utf-8"?>
 <p:sld xmlns:a="http://schemas.openxmlformats.org/drawingml/2006/main" xmlns:r="http://schemas.openxmlformats.org/officeDocument/2006/relationships" xmlns:p="http://schemas.openxmlformats.org/presentationml/2006/main">
   <p:cSld>
     <p:bg>
@@ -9225,7 +9666,7 @@
 </p:sld>
 </file>
 
-<file path=ppt/slides/slide17.xml><?xml version="1.0" encoding="utf-8"?>
+<file path=ppt/slides/slide18.xml><?xml version="1.0" encoding="utf-8"?>
 <p:sld xmlns:a="http://schemas.openxmlformats.org/drawingml/2006/main" xmlns:r="http://schemas.openxmlformats.org/officeDocument/2006/relationships" xmlns:p="http://schemas.openxmlformats.org/presentationml/2006/main">
   <p:cSld>
     <p:bg>
@@ -9786,7 +10227,7 @@
 </p:sld>
 </file>
 
-<file path=ppt/slides/slide18.xml><?xml version="1.0" encoding="utf-8"?>
+<file path=ppt/slides/slide19.xml><?xml version="1.0" encoding="utf-8"?>
 <p:sld xmlns:a="http://schemas.openxmlformats.org/drawingml/2006/main" xmlns:r="http://schemas.openxmlformats.org/officeDocument/2006/relationships" xmlns:p="http://schemas.openxmlformats.org/presentationml/2006/main">
   <p:cSld>
     <p:bg>
@@ -10220,7 +10661,140 @@
 </p:sld>
 </file>
 
-<file path=ppt/slides/slide19.xml><?xml version="1.0" encoding="utf-8"?>
+<file path=ppt/slides/slide2.xml><?xml version="1.0" encoding="utf-8"?>
+<p:sld xmlns:a="http://schemas.openxmlformats.org/drawingml/2006/main" xmlns:r="http://schemas.openxmlformats.org/officeDocument/2006/relationships" xmlns:p="http://schemas.openxmlformats.org/presentationml/2006/main">
+  <p:cSld>
+    <p:bg>
+      <p:bgPr>
+        <a:blipFill dpi="0" rotWithShape="1">
+          <a:blip r:embed="rId2">
+            <a:lum/>
+          </a:blip>
+          <a:srcRect/>
+          <a:stretch>
+            <a:fillRect/>
+          </a:stretch>
+        </a:blipFill>
+        <a:effectLst/>
+      </p:bgPr>
+    </p:bg>
+    <p:spTree>
+      <p:nvGrpSpPr>
+        <p:cNvPr id="1" name=""/>
+        <p:cNvGrpSpPr/>
+        <p:nvPr/>
+      </p:nvGrpSpPr>
+      <p:grpSpPr>
+        <a:xfrm>
+          <a:off x="0" y="0"/>
+          <a:ext cx="0" cy="0"/>
+          <a:chOff x="0" y="0"/>
+          <a:chExt cx="0" cy="0"/>
+        </a:xfrm>
+      </p:grpSpPr>
+      <p:sp>
+        <p:nvSpPr>
+          <p:cNvPr id="4" name="Rectangle 3">
+            <a:extLst>
+              <a:ext uri="{FF2B5EF4-FFF2-40B4-BE49-F238E27FC236}">
+                <a16:creationId xmlns:a16="http://schemas.microsoft.com/office/drawing/2014/main" id="{337FD38D-6887-9FE9-2808-89EB0910C0C9}"/>
+              </a:ext>
+            </a:extLst>
+          </p:cNvPr>
+          <p:cNvSpPr/>
+          <p:nvPr/>
+        </p:nvSpPr>
+        <p:spPr>
+          <a:xfrm>
+            <a:off x="3161542" y="2151727"/>
+            <a:ext cx="5868915" cy="2554545"/>
+          </a:xfrm>
+          <a:prstGeom prst="rect">
+            <a:avLst/>
+          </a:prstGeom>
+          <a:noFill/>
+        </p:spPr>
+        <p:txBody>
+          <a:bodyPr wrap="none" lIns="91440" tIns="45720" rIns="91440" bIns="45720">
+            <a:spAutoFit/>
+          </a:bodyPr>
+          <a:lstStyle/>
+          <a:p>
+            <a:pPr algn="ctr"/>
+            <a:r>
+              <a:rPr lang="en-US" sz="8000" b="0" cap="none" spc="0" dirty="0">
+                <a:ln w="0"/>
+                <a:solidFill>
+                  <a:schemeClr val="bg1"/>
+                </a:solidFill>
+                <a:effectLst>
+                  <a:outerShdw blurRad="38100" dist="19050" dir="2700000" algn="tl" rotWithShape="0">
+                    <a:schemeClr val="dk1">
+                      <a:alpha val="40000"/>
+                    </a:schemeClr>
+                  </a:outerShdw>
+                </a:effectLst>
+                <a:latin typeface="Fira Code SemiBold" panose="020B0809050000020004" pitchFamily="49" charset="0"/>
+                <a:ea typeface="Fira Code SemiBold" panose="020B0809050000020004" pitchFamily="49" charset="0"/>
+              </a:rPr>
+              <a:t>SHELL</a:t>
+            </a:r>
+          </a:p>
+          <a:p>
+            <a:pPr algn="ctr"/>
+            <a:r>
+              <a:rPr lang="en-US" sz="8000" dirty="0">
+                <a:ln w="0"/>
+                <a:solidFill>
+                  <a:schemeClr val="bg1"/>
+                </a:solidFill>
+                <a:effectLst>
+                  <a:outerShdw blurRad="38100" dist="19050" dir="2700000" algn="tl" rotWithShape="0">
+                    <a:schemeClr val="dk1">
+                      <a:alpha val="40000"/>
+                    </a:schemeClr>
+                  </a:outerShdw>
+                </a:effectLst>
+                <a:latin typeface="Fira Code SemiBold" panose="020B0809050000020004" pitchFamily="49" charset="0"/>
+                <a:ea typeface="Fira Code SemiBold" panose="020B0809050000020004" pitchFamily="49" charset="0"/>
+              </a:rPr>
+              <a:t>SCRIPTING</a:t>
+            </a:r>
+            <a:endParaRPr lang="en-US" sz="6600" b="0" cap="none" spc="0" dirty="0">
+              <a:ln w="0"/>
+              <a:solidFill>
+                <a:schemeClr val="bg1"/>
+              </a:solidFill>
+              <a:effectLst>
+                <a:outerShdw blurRad="38100" dist="19050" dir="2700000" algn="tl" rotWithShape="0">
+                  <a:schemeClr val="dk1">
+                    <a:alpha val="40000"/>
+                  </a:schemeClr>
+                </a:outerShdw>
+              </a:effectLst>
+              <a:latin typeface="Fira Code SemiBold" panose="020B0809050000020004" pitchFamily="49" charset="0"/>
+              <a:ea typeface="Fira Code SemiBold" panose="020B0809050000020004" pitchFamily="49" charset="0"/>
+            </a:endParaRPr>
+          </a:p>
+        </p:txBody>
+      </p:sp>
+    </p:spTree>
+    <p:extLst>
+      <p:ext uri="{BB962C8B-B14F-4D97-AF65-F5344CB8AC3E}">
+        <p14:creationId xmlns:p14="http://schemas.microsoft.com/office/powerpoint/2010/main" val="3956920941"/>
+      </p:ext>
+    </p:extLst>
+  </p:cSld>
+  <p:clrMapOvr>
+    <a:masterClrMapping/>
+  </p:clrMapOvr>
+  <p:transition>
+    <p:fade/>
+  </p:transition>
+</p:sld>
+</file>
+
+<file path=ppt/slides/slide20.xml><?xml version="1.0" encoding="utf-8"?>
 <p:sld xmlns:a="http://schemas.openxmlformats.org/drawingml/2006/main" xmlns:r="http://schemas.openxmlformats.org/officeDocument/2006/relationships" xmlns:p="http://schemas.openxmlformats.org/presentationml/2006/main">
   <p:cSld>
     <p:bg>
@@ -10600,140 +11174,7 @@
 </p:sld>
 </file>
 
-<file path=ppt/slides/slide2.xml><?xml version="1.0" encoding="utf-8"?>
-<p:sld xmlns:a="http://schemas.openxmlformats.org/drawingml/2006/main" xmlns:r="http://schemas.openxmlformats.org/officeDocument/2006/relationships" xmlns:p="http://schemas.openxmlformats.org/presentationml/2006/main">
-  <p:cSld>
-    <p:bg>
-      <p:bgPr>
-        <a:blipFill dpi="0" rotWithShape="1">
-          <a:blip r:embed="rId2">
-            <a:lum/>
-          </a:blip>
-          <a:srcRect/>
-          <a:stretch>
-            <a:fillRect/>
-          </a:stretch>
-        </a:blipFill>
-        <a:effectLst/>
-      </p:bgPr>
-    </p:bg>
-    <p:spTree>
-      <p:nvGrpSpPr>
-        <p:cNvPr id="1" name=""/>
-        <p:cNvGrpSpPr/>
-        <p:nvPr/>
-      </p:nvGrpSpPr>
-      <p:grpSpPr>
-        <a:xfrm>
-          <a:off x="0" y="0"/>
-          <a:ext cx="0" cy="0"/>
-          <a:chOff x="0" y="0"/>
-          <a:chExt cx="0" cy="0"/>
-        </a:xfrm>
-      </p:grpSpPr>
-      <p:sp>
-        <p:nvSpPr>
-          <p:cNvPr id="4" name="Rectangle 3">
-            <a:extLst>
-              <a:ext uri="{FF2B5EF4-FFF2-40B4-BE49-F238E27FC236}">
-                <a16:creationId xmlns:a16="http://schemas.microsoft.com/office/drawing/2014/main" id="{337FD38D-6887-9FE9-2808-89EB0910C0C9}"/>
-              </a:ext>
-            </a:extLst>
-          </p:cNvPr>
-          <p:cNvSpPr/>
-          <p:nvPr/>
-        </p:nvSpPr>
-        <p:spPr>
-          <a:xfrm>
-            <a:off x="3161542" y="2151727"/>
-            <a:ext cx="5868915" cy="2554545"/>
-          </a:xfrm>
-          <a:prstGeom prst="rect">
-            <a:avLst/>
-          </a:prstGeom>
-          <a:noFill/>
-        </p:spPr>
-        <p:txBody>
-          <a:bodyPr wrap="none" lIns="91440" tIns="45720" rIns="91440" bIns="45720">
-            <a:spAutoFit/>
-          </a:bodyPr>
-          <a:lstStyle/>
-          <a:p>
-            <a:pPr algn="ctr"/>
-            <a:r>
-              <a:rPr lang="en-US" sz="8000" b="0" cap="none" spc="0" dirty="0">
-                <a:ln w="0"/>
-                <a:solidFill>
-                  <a:schemeClr val="bg1"/>
-                </a:solidFill>
-                <a:effectLst>
-                  <a:outerShdw blurRad="38100" dist="19050" dir="2700000" algn="tl" rotWithShape="0">
-                    <a:schemeClr val="dk1">
-                      <a:alpha val="40000"/>
-                    </a:schemeClr>
-                  </a:outerShdw>
-                </a:effectLst>
-                <a:latin typeface="Fira Code SemiBold" panose="020B0809050000020004" pitchFamily="49" charset="0"/>
-                <a:ea typeface="Fira Code SemiBold" panose="020B0809050000020004" pitchFamily="49" charset="0"/>
-              </a:rPr>
-              <a:t>SHELL</a:t>
-            </a:r>
-          </a:p>
-          <a:p>
-            <a:pPr algn="ctr"/>
-            <a:r>
-              <a:rPr lang="en-US" sz="8000" dirty="0">
-                <a:ln w="0"/>
-                <a:solidFill>
-                  <a:schemeClr val="bg1"/>
-                </a:solidFill>
-                <a:effectLst>
-                  <a:outerShdw blurRad="38100" dist="19050" dir="2700000" algn="tl" rotWithShape="0">
-                    <a:schemeClr val="dk1">
-                      <a:alpha val="40000"/>
-                    </a:schemeClr>
-                  </a:outerShdw>
-                </a:effectLst>
-                <a:latin typeface="Fira Code SemiBold" panose="020B0809050000020004" pitchFamily="49" charset="0"/>
-                <a:ea typeface="Fira Code SemiBold" panose="020B0809050000020004" pitchFamily="49" charset="0"/>
-              </a:rPr>
-              <a:t>SCRIPTING</a:t>
-            </a:r>
-            <a:endParaRPr lang="en-US" sz="6600" b="0" cap="none" spc="0" dirty="0">
-              <a:ln w="0"/>
-              <a:solidFill>
-                <a:schemeClr val="bg1"/>
-              </a:solidFill>
-              <a:effectLst>
-                <a:outerShdw blurRad="38100" dist="19050" dir="2700000" algn="tl" rotWithShape="0">
-                  <a:schemeClr val="dk1">
-                    <a:alpha val="40000"/>
-                  </a:schemeClr>
-                </a:outerShdw>
-              </a:effectLst>
-              <a:latin typeface="Fira Code SemiBold" panose="020B0809050000020004" pitchFamily="49" charset="0"/>
-              <a:ea typeface="Fira Code SemiBold" panose="020B0809050000020004" pitchFamily="49" charset="0"/>
-            </a:endParaRPr>
-          </a:p>
-        </p:txBody>
-      </p:sp>
-    </p:spTree>
-    <p:extLst>
-      <p:ext uri="{BB962C8B-B14F-4D97-AF65-F5344CB8AC3E}">
-        <p14:creationId xmlns:p14="http://schemas.microsoft.com/office/powerpoint/2010/main" val="3956920941"/>
-      </p:ext>
-    </p:extLst>
-  </p:cSld>
-  <p:clrMapOvr>
-    <a:masterClrMapping/>
-  </p:clrMapOvr>
-  <p:transition>
-    <p:fade/>
-  </p:transition>
-</p:sld>
-</file>
-
-<file path=ppt/slides/slide20.xml><?xml version="1.0" encoding="utf-8"?>
+<file path=ppt/slides/slide21.xml><?xml version="1.0" encoding="utf-8"?>
 <p:sld xmlns:a="http://schemas.openxmlformats.org/drawingml/2006/main" xmlns:r="http://schemas.openxmlformats.org/officeDocument/2006/relationships" xmlns:p="http://schemas.openxmlformats.org/presentationml/2006/main">
   <p:cSld>
     <p:bg>
@@ -10902,7 +11343,7 @@
 </p:sld>
 </file>
 
-<file path=ppt/slides/slide21.xml><?xml version="1.0" encoding="utf-8"?>
+<file path=ppt/slides/slide22.xml><?xml version="1.0" encoding="utf-8"?>
 <p:sld xmlns:a="http://schemas.openxmlformats.org/drawingml/2006/main" xmlns:r="http://schemas.openxmlformats.org/officeDocument/2006/relationships" xmlns:p="http://schemas.openxmlformats.org/presentationml/2006/main">
   <p:cSld>
     <p:bg>
@@ -11472,7 +11913,7 @@
 </p:sld>
 </file>
 
-<file path=ppt/slides/slide22.xml><?xml version="1.0" encoding="utf-8"?>
+<file path=ppt/slides/slide23.xml><?xml version="1.0" encoding="utf-8"?>
 <p:sld xmlns:a="http://schemas.openxmlformats.org/drawingml/2006/main" xmlns:r="http://schemas.openxmlformats.org/officeDocument/2006/relationships" xmlns:p="http://schemas.openxmlformats.org/presentationml/2006/main">
   <p:cSld>
     <p:bg>
@@ -12111,7 +12552,7 @@
 </p:sld>
 </file>
 
-<file path=ppt/slides/slide23.xml><?xml version="1.0" encoding="utf-8"?>
+<file path=ppt/slides/slide24.xml><?xml version="1.0" encoding="utf-8"?>
 <p:sld xmlns:a="http://schemas.openxmlformats.org/drawingml/2006/main" xmlns:r="http://schemas.openxmlformats.org/officeDocument/2006/relationships" xmlns:p="http://schemas.openxmlformats.org/presentationml/2006/main">
   <p:cSld>
     <p:bg>
@@ -12914,7 +13355,7 @@
 </p:sld>
 </file>
 
-<file path=ppt/slides/slide24.xml><?xml version="1.0" encoding="utf-8"?>
+<file path=ppt/slides/slide25.xml><?xml version="1.0" encoding="utf-8"?>
 <p:sld xmlns:a="http://schemas.openxmlformats.org/drawingml/2006/main" xmlns:r="http://schemas.openxmlformats.org/officeDocument/2006/relationships" xmlns:p="http://schemas.openxmlformats.org/presentationml/2006/main">
   <p:cSld>
     <p:bg>
@@ -13348,7 +13789,7 @@
 </p:sld>
 </file>
 
-<file path=ppt/slides/slide25.xml><?xml version="1.0" encoding="utf-8"?>
+<file path=ppt/slides/slide26.xml><?xml version="1.0" encoding="utf-8"?>
 <p:sld xmlns:a="http://schemas.openxmlformats.org/drawingml/2006/main" xmlns:r="http://schemas.openxmlformats.org/officeDocument/2006/relationships" xmlns:p="http://schemas.openxmlformats.org/presentationml/2006/main">
   <p:cSld>
     <p:bg>
@@ -13657,7 +14098,7 @@
 </p:sld>
 </file>
 
-<file path=ppt/slides/slide26.xml><?xml version="1.0" encoding="utf-8"?>
+<file path=ppt/slides/slide27.xml><?xml version="1.0" encoding="utf-8"?>
 <p:sld xmlns:a="http://schemas.openxmlformats.org/drawingml/2006/main" xmlns:r="http://schemas.openxmlformats.org/officeDocument/2006/relationships" xmlns:p="http://schemas.openxmlformats.org/presentationml/2006/main">
   <p:cSld>
     <p:bg>
@@ -13841,7 +14282,7 @@
 </p:sld>
 </file>
 
-<file path=ppt/slides/slide27.xml><?xml version="1.0" encoding="utf-8"?>
+<file path=ppt/slides/slide28.xml><?xml version="1.0" encoding="utf-8"?>
 <p:sld xmlns:a="http://schemas.openxmlformats.org/drawingml/2006/main" xmlns:r="http://schemas.openxmlformats.org/officeDocument/2006/relationships" xmlns:p="http://schemas.openxmlformats.org/presentationml/2006/main">
   <p:cSld>
     <p:bg>
@@ -14386,7 +14827,7 @@
 </p:sld>
 </file>
 
-<file path=ppt/slides/slide28.xml><?xml version="1.0" encoding="utf-8"?>
+<file path=ppt/slides/slide29.xml><?xml version="1.0" encoding="utf-8"?>
 <p:sld xmlns:a="http://schemas.openxmlformats.org/drawingml/2006/main" xmlns:r="http://schemas.openxmlformats.org/officeDocument/2006/relationships" xmlns:p="http://schemas.openxmlformats.org/presentationml/2006/main">
   <p:cSld>
     <p:bg>
@@ -14835,294 +15276,6 @@
 </p:sld>
 </file>
 
-<file path=ppt/slides/slide29.xml><?xml version="1.0" encoding="utf-8"?>
-<p:sld xmlns:a="http://schemas.openxmlformats.org/drawingml/2006/main" xmlns:r="http://schemas.openxmlformats.org/officeDocument/2006/relationships" xmlns:p="http://schemas.openxmlformats.org/presentationml/2006/main">
-  <p:cSld>
-    <p:bg>
-      <p:bgPr>
-        <a:blipFill dpi="0" rotWithShape="1">
-          <a:blip r:embed="rId3">
-            <a:lum/>
-          </a:blip>
-          <a:srcRect/>
-          <a:stretch>
-            <a:fillRect t="-9000" b="-9000"/>
-          </a:stretch>
-        </a:blipFill>
-        <a:effectLst/>
-      </p:bgPr>
-    </p:bg>
-    <p:spTree>
-      <p:nvGrpSpPr>
-        <p:cNvPr id="1" name=""/>
-        <p:cNvGrpSpPr/>
-        <p:nvPr/>
-      </p:nvGrpSpPr>
-      <p:grpSpPr>
-        <a:xfrm>
-          <a:off x="0" y="0"/>
-          <a:ext cx="0" cy="0"/>
-          <a:chOff x="0" y="0"/>
-          <a:chExt cx="0" cy="0"/>
-        </a:xfrm>
-      </p:grpSpPr>
-      <p:sp>
-        <p:nvSpPr>
-          <p:cNvPr id="2" name="Rectangle 1">
-            <a:extLst>
-              <a:ext uri="{FF2B5EF4-FFF2-40B4-BE49-F238E27FC236}">
-                <a16:creationId xmlns:a16="http://schemas.microsoft.com/office/drawing/2014/main" id="{E519822D-3C02-FE88-8748-DC75115DA964}"/>
-              </a:ext>
-            </a:extLst>
-          </p:cNvPr>
-          <p:cNvSpPr/>
-          <p:nvPr/>
-        </p:nvSpPr>
-        <p:spPr>
-          <a:xfrm>
-            <a:off x="89587" y="211166"/>
-            <a:ext cx="6793848" cy="769441"/>
-          </a:xfrm>
-          <a:prstGeom prst="rect">
-            <a:avLst/>
-          </a:prstGeom>
-          <a:noFill/>
-        </p:spPr>
-        <p:txBody>
-          <a:bodyPr wrap="none" lIns="91440" tIns="45720" rIns="91440" bIns="45720">
-            <a:spAutoFit/>
-          </a:bodyPr>
-          <a:lstStyle/>
-          <a:p>
-            <a:pPr algn="ctr"/>
-            <a:r>
-              <a:rPr lang="en-US" sz="4400" dirty="0">
-                <a:ln w="0"/>
-                <a:solidFill>
-                  <a:schemeClr val="bg1"/>
-                </a:solidFill>
-                <a:effectLst>
-                  <a:outerShdw blurRad="38100" dist="19050" dir="2700000" algn="tl" rotWithShape="0">
-                    <a:schemeClr val="dk1">
-                      <a:alpha val="40000"/>
-                    </a:schemeClr>
-                  </a:outerShdw>
-                </a:effectLst>
-                <a:latin typeface="Fira Code SemiBold" panose="020B0809050000020004" pitchFamily="49" charset="0"/>
-                <a:ea typeface="Fira Code SemiBold" panose="020B0809050000020004" pitchFamily="49" charset="0"/>
-              </a:rPr>
-              <a:t>Read first few rows</a:t>
-            </a:r>
-            <a:endParaRPr lang="en-US" sz="4400" b="0" cap="none" spc="0" dirty="0">
-              <a:ln w="0"/>
-              <a:solidFill>
-                <a:schemeClr val="bg1"/>
-              </a:solidFill>
-              <a:effectLst>
-                <a:outerShdw blurRad="38100" dist="19050" dir="2700000" algn="tl" rotWithShape="0">
-                  <a:schemeClr val="dk1">
-                    <a:alpha val="40000"/>
-                  </a:schemeClr>
-                </a:outerShdw>
-              </a:effectLst>
-              <a:latin typeface="Fira Code SemiBold" panose="020B0809050000020004" pitchFamily="49" charset="0"/>
-              <a:ea typeface="Fira Code SemiBold" panose="020B0809050000020004" pitchFamily="49" charset="0"/>
-            </a:endParaRPr>
-          </a:p>
-        </p:txBody>
-      </p:sp>
-      <p:pic>
-        <p:nvPicPr>
-          <p:cNvPr id="7" name="Picture 6">
-            <a:extLst>
-              <a:ext uri="{FF2B5EF4-FFF2-40B4-BE49-F238E27FC236}">
-                <a16:creationId xmlns:a16="http://schemas.microsoft.com/office/drawing/2014/main" id="{4B7E1F92-F32D-3FAA-1E4D-6C1122A79E60}"/>
-              </a:ext>
-            </a:extLst>
-          </p:cNvPr>
-          <p:cNvPicPr>
-            <a:picLocks noChangeAspect="1"/>
-          </p:cNvPicPr>
-          <p:nvPr/>
-        </p:nvPicPr>
-        <p:blipFill>
-          <a:blip r:embed="rId4">
-            <a:extLst>
-              <a:ext uri="{28A0092B-C50C-407E-A947-70E740481C1C}">
-                <a14:useLocalDpi xmlns:a14="http://schemas.microsoft.com/office/drawing/2010/main" val="0"/>
-              </a:ext>
-            </a:extLst>
-          </a:blip>
-          <a:stretch>
-            <a:fillRect/>
-          </a:stretch>
-        </p:blipFill>
-        <p:spPr>
-          <a:xfrm>
-            <a:off x="-864128" y="513852"/>
-            <a:ext cx="8134350" cy="5695950"/>
-          </a:xfrm>
-          <a:prstGeom prst="rect">
-            <a:avLst/>
-          </a:prstGeom>
-        </p:spPr>
-      </p:pic>
-      <p:pic>
-        <p:nvPicPr>
-          <p:cNvPr id="9" name="Picture 8">
-            <a:extLst>
-              <a:ext uri="{FF2B5EF4-FFF2-40B4-BE49-F238E27FC236}">
-                <a16:creationId xmlns:a16="http://schemas.microsoft.com/office/drawing/2014/main" id="{3C5949D2-9DF2-6E59-8FA1-E76103FBA92B}"/>
-              </a:ext>
-            </a:extLst>
-          </p:cNvPr>
-          <p:cNvPicPr>
-            <a:picLocks noChangeAspect="1"/>
-          </p:cNvPicPr>
-          <p:nvPr/>
-        </p:nvPicPr>
-        <p:blipFill>
-          <a:blip r:embed="rId5">
-            <a:extLst>
-              <a:ext uri="{28A0092B-C50C-407E-A947-70E740481C1C}">
-                <a14:useLocalDpi xmlns:a14="http://schemas.microsoft.com/office/drawing/2010/main" val="0"/>
-              </a:ext>
-            </a:extLst>
-          </a:blip>
-          <a:stretch>
-            <a:fillRect/>
-          </a:stretch>
-        </p:blipFill>
-        <p:spPr>
-          <a:xfrm>
-            <a:off x="5623036" y="815986"/>
-            <a:ext cx="7200068" cy="5091682"/>
-          </a:xfrm>
-          <a:prstGeom prst="rect">
-            <a:avLst/>
-          </a:prstGeom>
-        </p:spPr>
-      </p:pic>
-      <p:sp>
-        <p:nvSpPr>
-          <p:cNvPr id="3" name="Rectangle 2">
-            <a:extLst>
-              <a:ext uri="{FF2B5EF4-FFF2-40B4-BE49-F238E27FC236}">
-                <a16:creationId xmlns:a16="http://schemas.microsoft.com/office/drawing/2014/main" id="{3BE6ECCC-778E-9207-8DD4-AF0564A62BC4}"/>
-              </a:ext>
-            </a:extLst>
-          </p:cNvPr>
-          <p:cNvSpPr/>
-          <p:nvPr/>
-        </p:nvSpPr>
-        <p:spPr>
-          <a:xfrm>
-            <a:off x="0" y="0"/>
-            <a:ext cx="12192000" cy="6858000"/>
-          </a:xfrm>
-          <a:prstGeom prst="rect">
-            <a:avLst/>
-          </a:prstGeom>
-          <a:solidFill>
-            <a:schemeClr val="tx1">
-              <a:alpha val="66000"/>
-            </a:schemeClr>
-          </a:solidFill>
-          <a:ln>
-            <a:noFill/>
-          </a:ln>
-        </p:spPr>
-        <p:style>
-          <a:lnRef idx="2">
-            <a:schemeClr val="accent1">
-              <a:shade val="50000"/>
-            </a:schemeClr>
-          </a:lnRef>
-          <a:fillRef idx="1">
-            <a:schemeClr val="accent1"/>
-          </a:fillRef>
-          <a:effectRef idx="0">
-            <a:schemeClr val="accent1"/>
-          </a:effectRef>
-          <a:fontRef idx="minor">
-            <a:schemeClr val="lt1"/>
-          </a:fontRef>
-        </p:style>
-        <p:txBody>
-          <a:bodyPr rtlCol="0" anchor="ctr"/>
-          <a:lstStyle/>
-          <a:p>
-            <a:pPr algn="ctr"/>
-            <a:endParaRPr lang="en-IN" dirty="0"/>
-          </a:p>
-        </p:txBody>
-      </p:sp>
-      <p:sp>
-        <p:nvSpPr>
-          <p:cNvPr id="4" name="Rectangle 3">
-            <a:extLst>
-              <a:ext uri="{FF2B5EF4-FFF2-40B4-BE49-F238E27FC236}">
-                <a16:creationId xmlns:a16="http://schemas.microsoft.com/office/drawing/2014/main" id="{2F590C44-DD35-56CD-1969-B0B891D91EBA}"/>
-              </a:ext>
-            </a:extLst>
-          </p:cNvPr>
-          <p:cNvSpPr/>
-          <p:nvPr/>
-        </p:nvSpPr>
-        <p:spPr>
-          <a:xfrm>
-            <a:off x="519072" y="2299998"/>
-            <a:ext cx="11153855" cy="2123658"/>
-          </a:xfrm>
-          <a:prstGeom prst="rect">
-            <a:avLst/>
-          </a:prstGeom>
-          <a:noFill/>
-        </p:spPr>
-        <p:txBody>
-          <a:bodyPr wrap="square" lIns="91440" tIns="45720" rIns="91440" bIns="45720">
-            <a:spAutoFit/>
-          </a:bodyPr>
-          <a:lstStyle/>
-          <a:p>
-            <a:pPr algn="ctr"/>
-            <a:r>
-              <a:rPr lang="en-US" sz="4400" b="0" cap="none" spc="0" dirty="0">
-                <a:ln w="0"/>
-                <a:solidFill>
-                  <a:schemeClr val="bg1"/>
-                </a:solidFill>
-                <a:effectLst>
-                  <a:outerShdw blurRad="38100" dist="19050" dir="2700000" algn="tl" rotWithShape="0">
-                    <a:schemeClr val="dk1">
-                      <a:alpha val="40000"/>
-                    </a:schemeClr>
-                  </a:outerShdw>
-                </a:effectLst>
-                <a:latin typeface="Fira Code Retina" panose="020B0809050000020004" pitchFamily="49" charset="0"/>
-                <a:ea typeface="Fira Code Retina" panose="020B0809050000020004" pitchFamily="49" charset="0"/>
-              </a:rPr>
-              <a:t>We can use head command along with tail command to read rows in a specific range</a:t>
-            </a:r>
-          </a:p>
-        </p:txBody>
-      </p:sp>
-    </p:spTree>
-    <p:extLst>
-      <p:ext uri="{BB962C8B-B14F-4D97-AF65-F5344CB8AC3E}">
-        <p14:creationId xmlns:p14="http://schemas.microsoft.com/office/powerpoint/2010/main" val="1199366511"/>
-      </p:ext>
-    </p:extLst>
-  </p:cSld>
-  <p:clrMapOvr>
-    <a:masterClrMapping/>
-  </p:clrMapOvr>
-  <p:transition>
-    <p:fade/>
-  </p:transition>
-</p:sld>
-</file>
-
 <file path=ppt/slides/slide3.xml><?xml version="1.0" encoding="utf-8"?>
 <p:sld xmlns:a="http://schemas.openxmlformats.org/drawingml/2006/main" xmlns:r="http://schemas.openxmlformats.org/officeDocument/2006/relationships" xmlns:p="http://schemas.openxmlformats.org/presentationml/2006/main">
   <p:cSld>
@@ -15469,6 +15622,294 @@
         <p:spPr>
           <a:xfrm>
             <a:off x="89587" y="211166"/>
+            <a:ext cx="6793848" cy="769441"/>
+          </a:xfrm>
+          <a:prstGeom prst="rect">
+            <a:avLst/>
+          </a:prstGeom>
+          <a:noFill/>
+        </p:spPr>
+        <p:txBody>
+          <a:bodyPr wrap="none" lIns="91440" tIns="45720" rIns="91440" bIns="45720">
+            <a:spAutoFit/>
+          </a:bodyPr>
+          <a:lstStyle/>
+          <a:p>
+            <a:pPr algn="ctr"/>
+            <a:r>
+              <a:rPr lang="en-US" sz="4400" dirty="0">
+                <a:ln w="0"/>
+                <a:solidFill>
+                  <a:schemeClr val="bg1"/>
+                </a:solidFill>
+                <a:effectLst>
+                  <a:outerShdw blurRad="38100" dist="19050" dir="2700000" algn="tl" rotWithShape="0">
+                    <a:schemeClr val="dk1">
+                      <a:alpha val="40000"/>
+                    </a:schemeClr>
+                  </a:outerShdw>
+                </a:effectLst>
+                <a:latin typeface="Fira Code SemiBold" panose="020B0809050000020004" pitchFamily="49" charset="0"/>
+                <a:ea typeface="Fira Code SemiBold" panose="020B0809050000020004" pitchFamily="49" charset="0"/>
+              </a:rPr>
+              <a:t>Read first few rows</a:t>
+            </a:r>
+            <a:endParaRPr lang="en-US" sz="4400" b="0" cap="none" spc="0" dirty="0">
+              <a:ln w="0"/>
+              <a:solidFill>
+                <a:schemeClr val="bg1"/>
+              </a:solidFill>
+              <a:effectLst>
+                <a:outerShdw blurRad="38100" dist="19050" dir="2700000" algn="tl" rotWithShape="0">
+                  <a:schemeClr val="dk1">
+                    <a:alpha val="40000"/>
+                  </a:schemeClr>
+                </a:outerShdw>
+              </a:effectLst>
+              <a:latin typeface="Fira Code SemiBold" panose="020B0809050000020004" pitchFamily="49" charset="0"/>
+              <a:ea typeface="Fira Code SemiBold" panose="020B0809050000020004" pitchFamily="49" charset="0"/>
+            </a:endParaRPr>
+          </a:p>
+        </p:txBody>
+      </p:sp>
+      <p:pic>
+        <p:nvPicPr>
+          <p:cNvPr id="7" name="Picture 6">
+            <a:extLst>
+              <a:ext uri="{FF2B5EF4-FFF2-40B4-BE49-F238E27FC236}">
+                <a16:creationId xmlns:a16="http://schemas.microsoft.com/office/drawing/2014/main" id="{4B7E1F92-F32D-3FAA-1E4D-6C1122A79E60}"/>
+              </a:ext>
+            </a:extLst>
+          </p:cNvPr>
+          <p:cNvPicPr>
+            <a:picLocks noChangeAspect="1"/>
+          </p:cNvPicPr>
+          <p:nvPr/>
+        </p:nvPicPr>
+        <p:blipFill>
+          <a:blip r:embed="rId4">
+            <a:extLst>
+              <a:ext uri="{28A0092B-C50C-407E-A947-70E740481C1C}">
+                <a14:useLocalDpi xmlns:a14="http://schemas.microsoft.com/office/drawing/2010/main" val="0"/>
+              </a:ext>
+            </a:extLst>
+          </a:blip>
+          <a:stretch>
+            <a:fillRect/>
+          </a:stretch>
+        </p:blipFill>
+        <p:spPr>
+          <a:xfrm>
+            <a:off x="-864128" y="513852"/>
+            <a:ext cx="8134350" cy="5695950"/>
+          </a:xfrm>
+          <a:prstGeom prst="rect">
+            <a:avLst/>
+          </a:prstGeom>
+        </p:spPr>
+      </p:pic>
+      <p:pic>
+        <p:nvPicPr>
+          <p:cNvPr id="9" name="Picture 8">
+            <a:extLst>
+              <a:ext uri="{FF2B5EF4-FFF2-40B4-BE49-F238E27FC236}">
+                <a16:creationId xmlns:a16="http://schemas.microsoft.com/office/drawing/2014/main" id="{3C5949D2-9DF2-6E59-8FA1-E76103FBA92B}"/>
+              </a:ext>
+            </a:extLst>
+          </p:cNvPr>
+          <p:cNvPicPr>
+            <a:picLocks noChangeAspect="1"/>
+          </p:cNvPicPr>
+          <p:nvPr/>
+        </p:nvPicPr>
+        <p:blipFill>
+          <a:blip r:embed="rId5">
+            <a:extLst>
+              <a:ext uri="{28A0092B-C50C-407E-A947-70E740481C1C}">
+                <a14:useLocalDpi xmlns:a14="http://schemas.microsoft.com/office/drawing/2010/main" val="0"/>
+              </a:ext>
+            </a:extLst>
+          </a:blip>
+          <a:stretch>
+            <a:fillRect/>
+          </a:stretch>
+        </p:blipFill>
+        <p:spPr>
+          <a:xfrm>
+            <a:off x="5623036" y="815986"/>
+            <a:ext cx="7200068" cy="5091682"/>
+          </a:xfrm>
+          <a:prstGeom prst="rect">
+            <a:avLst/>
+          </a:prstGeom>
+        </p:spPr>
+      </p:pic>
+      <p:sp>
+        <p:nvSpPr>
+          <p:cNvPr id="3" name="Rectangle 2">
+            <a:extLst>
+              <a:ext uri="{FF2B5EF4-FFF2-40B4-BE49-F238E27FC236}">
+                <a16:creationId xmlns:a16="http://schemas.microsoft.com/office/drawing/2014/main" id="{3BE6ECCC-778E-9207-8DD4-AF0564A62BC4}"/>
+              </a:ext>
+            </a:extLst>
+          </p:cNvPr>
+          <p:cNvSpPr/>
+          <p:nvPr/>
+        </p:nvSpPr>
+        <p:spPr>
+          <a:xfrm>
+            <a:off x="0" y="0"/>
+            <a:ext cx="12192000" cy="6858000"/>
+          </a:xfrm>
+          <a:prstGeom prst="rect">
+            <a:avLst/>
+          </a:prstGeom>
+          <a:solidFill>
+            <a:schemeClr val="tx1">
+              <a:alpha val="66000"/>
+            </a:schemeClr>
+          </a:solidFill>
+          <a:ln>
+            <a:noFill/>
+          </a:ln>
+        </p:spPr>
+        <p:style>
+          <a:lnRef idx="2">
+            <a:schemeClr val="accent1">
+              <a:shade val="50000"/>
+            </a:schemeClr>
+          </a:lnRef>
+          <a:fillRef idx="1">
+            <a:schemeClr val="accent1"/>
+          </a:fillRef>
+          <a:effectRef idx="0">
+            <a:schemeClr val="accent1"/>
+          </a:effectRef>
+          <a:fontRef idx="minor">
+            <a:schemeClr val="lt1"/>
+          </a:fontRef>
+        </p:style>
+        <p:txBody>
+          <a:bodyPr rtlCol="0" anchor="ctr"/>
+          <a:lstStyle/>
+          <a:p>
+            <a:pPr algn="ctr"/>
+            <a:endParaRPr lang="en-IN" dirty="0"/>
+          </a:p>
+        </p:txBody>
+      </p:sp>
+      <p:sp>
+        <p:nvSpPr>
+          <p:cNvPr id="4" name="Rectangle 3">
+            <a:extLst>
+              <a:ext uri="{FF2B5EF4-FFF2-40B4-BE49-F238E27FC236}">
+                <a16:creationId xmlns:a16="http://schemas.microsoft.com/office/drawing/2014/main" id="{2F590C44-DD35-56CD-1969-B0B891D91EBA}"/>
+              </a:ext>
+            </a:extLst>
+          </p:cNvPr>
+          <p:cNvSpPr/>
+          <p:nvPr/>
+        </p:nvSpPr>
+        <p:spPr>
+          <a:xfrm>
+            <a:off x="519072" y="2299998"/>
+            <a:ext cx="11153855" cy="2123658"/>
+          </a:xfrm>
+          <a:prstGeom prst="rect">
+            <a:avLst/>
+          </a:prstGeom>
+          <a:noFill/>
+        </p:spPr>
+        <p:txBody>
+          <a:bodyPr wrap="square" lIns="91440" tIns="45720" rIns="91440" bIns="45720">
+            <a:spAutoFit/>
+          </a:bodyPr>
+          <a:lstStyle/>
+          <a:p>
+            <a:pPr algn="ctr"/>
+            <a:r>
+              <a:rPr lang="en-US" sz="4400" b="0" cap="none" spc="0" dirty="0">
+                <a:ln w="0"/>
+                <a:solidFill>
+                  <a:schemeClr val="bg1"/>
+                </a:solidFill>
+                <a:effectLst>
+                  <a:outerShdw blurRad="38100" dist="19050" dir="2700000" algn="tl" rotWithShape="0">
+                    <a:schemeClr val="dk1">
+                      <a:alpha val="40000"/>
+                    </a:schemeClr>
+                  </a:outerShdw>
+                </a:effectLst>
+                <a:latin typeface="Fira Code Retina" panose="020B0809050000020004" pitchFamily="49" charset="0"/>
+                <a:ea typeface="Fira Code Retina" panose="020B0809050000020004" pitchFamily="49" charset="0"/>
+              </a:rPr>
+              <a:t>We can use head command along with tail command to read rows in a specific range</a:t>
+            </a:r>
+          </a:p>
+        </p:txBody>
+      </p:sp>
+    </p:spTree>
+    <p:extLst>
+      <p:ext uri="{BB962C8B-B14F-4D97-AF65-F5344CB8AC3E}">
+        <p14:creationId xmlns:p14="http://schemas.microsoft.com/office/powerpoint/2010/main" val="1199366511"/>
+      </p:ext>
+    </p:extLst>
+  </p:cSld>
+  <p:clrMapOvr>
+    <a:masterClrMapping/>
+  </p:clrMapOvr>
+  <p:transition>
+    <p:fade/>
+  </p:transition>
+</p:sld>
+</file>
+
+<file path=ppt/slides/slide31.xml><?xml version="1.0" encoding="utf-8"?>
+<p:sld xmlns:a="http://schemas.openxmlformats.org/drawingml/2006/main" xmlns:r="http://schemas.openxmlformats.org/officeDocument/2006/relationships" xmlns:p="http://schemas.openxmlformats.org/presentationml/2006/main">
+  <p:cSld>
+    <p:bg>
+      <p:bgPr>
+        <a:blipFill dpi="0" rotWithShape="1">
+          <a:blip r:embed="rId3">
+            <a:lum/>
+          </a:blip>
+          <a:srcRect/>
+          <a:stretch>
+            <a:fillRect t="-9000" b="-9000"/>
+          </a:stretch>
+        </a:blipFill>
+        <a:effectLst/>
+      </p:bgPr>
+    </p:bg>
+    <p:spTree>
+      <p:nvGrpSpPr>
+        <p:cNvPr id="1" name=""/>
+        <p:cNvGrpSpPr/>
+        <p:nvPr/>
+      </p:nvGrpSpPr>
+      <p:grpSpPr>
+        <a:xfrm>
+          <a:off x="0" y="0"/>
+          <a:ext cx="0" cy="0"/>
+          <a:chOff x="0" y="0"/>
+          <a:chExt cx="0" cy="0"/>
+        </a:xfrm>
+      </p:grpSpPr>
+      <p:sp>
+        <p:nvSpPr>
+          <p:cNvPr id="2" name="Rectangle 1">
+            <a:extLst>
+              <a:ext uri="{FF2B5EF4-FFF2-40B4-BE49-F238E27FC236}">
+                <a16:creationId xmlns:a16="http://schemas.microsoft.com/office/drawing/2014/main" id="{E519822D-3C02-FE88-8748-DC75115DA964}"/>
+              </a:ext>
+            </a:extLst>
+          </p:cNvPr>
+          <p:cNvSpPr/>
+          <p:nvPr/>
+        </p:nvSpPr>
+        <p:spPr>
+          <a:xfrm>
+            <a:off x="89587" y="211166"/>
             <a:ext cx="10272364" cy="769441"/>
           </a:xfrm>
           <a:prstGeom prst="rect">
@@ -15606,7 +16047,7 @@
 </p:sld>
 </file>
 
-<file path=ppt/slides/slide31.xml><?xml version="1.0" encoding="utf-8"?>
+<file path=ppt/slides/slide32.xml><?xml version="1.0" encoding="utf-8"?>
 <p:sld xmlns:a="http://schemas.openxmlformats.org/drawingml/2006/main" xmlns:r="http://schemas.openxmlformats.org/officeDocument/2006/relationships" xmlns:p="http://schemas.openxmlformats.org/presentationml/2006/main">
   <p:cSld>
     <p:bg>
@@ -16079,7 +16520,7 @@
 </p:sld>
 </file>
 
-<file path=ppt/slides/slide32.xml><?xml version="1.0" encoding="utf-8"?>
+<file path=ppt/slides/slide33.xml><?xml version="1.0" encoding="utf-8"?>
 <p:sld xmlns:a="http://schemas.openxmlformats.org/drawingml/2006/main" xmlns:r="http://schemas.openxmlformats.org/officeDocument/2006/relationships" xmlns:p="http://schemas.openxmlformats.org/presentationml/2006/main">
   <p:cSld>
     <p:bg>
@@ -17371,7 +17812,7 @@
 </p:sld>
 </file>
 
-<file path=ppt/slides/slide33.xml><?xml version="1.0" encoding="utf-8"?>
+<file path=ppt/slides/slide34.xml><?xml version="1.0" encoding="utf-8"?>
 <p:sld xmlns:a="http://schemas.openxmlformats.org/drawingml/2006/main" xmlns:r="http://schemas.openxmlformats.org/officeDocument/2006/relationships" xmlns:p="http://schemas.openxmlformats.org/presentationml/2006/main">
   <p:cSld>
     <p:bg>
@@ -17819,7 +18260,7 @@
 </p:sld>
 </file>
 
-<file path=ppt/slides/slide34.xml><?xml version="1.0" encoding="utf-8"?>
+<file path=ppt/slides/slide35.xml><?xml version="1.0" encoding="utf-8"?>
 <p:sld xmlns:a="http://schemas.openxmlformats.org/drawingml/2006/main" xmlns:r="http://schemas.openxmlformats.org/officeDocument/2006/relationships" xmlns:p="http://schemas.openxmlformats.org/presentationml/2006/main">
   <p:cSld>
     <p:bg>
@@ -18232,7 +18673,7 @@
 </p:sld>
 </file>
 
-<file path=ppt/slides/slide35.xml><?xml version="1.0" encoding="utf-8"?>
+<file path=ppt/slides/slide36.xml><?xml version="1.0" encoding="utf-8"?>
 <p:sld xmlns:a="http://schemas.openxmlformats.org/drawingml/2006/main" xmlns:r="http://schemas.openxmlformats.org/officeDocument/2006/relationships" xmlns:p="http://schemas.openxmlformats.org/presentationml/2006/main">
   <p:cSld>
     <p:bg>
@@ -18415,7 +18856,7 @@
 </p:sld>
 </file>
 
-<file path=ppt/slides/slide36.xml><?xml version="1.0" encoding="utf-8"?>
+<file path=ppt/slides/slide37.xml><?xml version="1.0" encoding="utf-8"?>
 <p:sld xmlns:a="http://schemas.openxmlformats.org/drawingml/2006/main" xmlns:r="http://schemas.openxmlformats.org/officeDocument/2006/relationships" xmlns:p="http://schemas.openxmlformats.org/presentationml/2006/main">
   <p:cSld>
     <p:bg>
@@ -18905,7 +19346,7 @@
 </p:sld>
 </file>
 
-<file path=ppt/slides/slide37.xml><?xml version="1.0" encoding="utf-8"?>
+<file path=ppt/slides/slide38.xml><?xml version="1.0" encoding="utf-8"?>
 <p:sld xmlns:a="http://schemas.openxmlformats.org/drawingml/2006/main" xmlns:r="http://schemas.openxmlformats.org/officeDocument/2006/relationships" xmlns:p="http://schemas.openxmlformats.org/presentationml/2006/main">
   <p:cSld>
     <p:bg>
@@ -19353,189 +19794,6 @@
 </p:sld>
 </file>
 
-<file path=ppt/slides/slide38.xml><?xml version="1.0" encoding="utf-8"?>
-<p:sld xmlns:a="http://schemas.openxmlformats.org/drawingml/2006/main" xmlns:r="http://schemas.openxmlformats.org/officeDocument/2006/relationships" xmlns:p="http://schemas.openxmlformats.org/presentationml/2006/main">
-  <p:cSld>
-    <p:bg>
-      <p:bgPr>
-        <a:blipFill dpi="0" rotWithShape="1">
-          <a:blip r:embed="rId3">
-            <a:lum/>
-          </a:blip>
-          <a:srcRect/>
-          <a:stretch>
-            <a:fillRect t="-9000" b="-9000"/>
-          </a:stretch>
-        </a:blipFill>
-        <a:effectLst/>
-      </p:bgPr>
-    </p:bg>
-    <p:spTree>
-      <p:nvGrpSpPr>
-        <p:cNvPr id="1" name=""/>
-        <p:cNvGrpSpPr/>
-        <p:nvPr/>
-      </p:nvGrpSpPr>
-      <p:grpSpPr>
-        <a:xfrm>
-          <a:off x="0" y="0"/>
-          <a:ext cx="0" cy="0"/>
-          <a:chOff x="0" y="0"/>
-          <a:chExt cx="0" cy="0"/>
-        </a:xfrm>
-      </p:grpSpPr>
-      <p:sp>
-        <p:nvSpPr>
-          <p:cNvPr id="2" name="Rectangle 1">
-            <a:extLst>
-              <a:ext uri="{FF2B5EF4-FFF2-40B4-BE49-F238E27FC236}">
-                <a16:creationId xmlns:a16="http://schemas.microsoft.com/office/drawing/2014/main" id="{E519822D-3C02-FE88-8748-DC75115DA964}"/>
-              </a:ext>
-            </a:extLst>
-          </p:cNvPr>
-          <p:cNvSpPr/>
-          <p:nvPr/>
-        </p:nvSpPr>
-        <p:spPr>
-          <a:xfrm>
-            <a:off x="89587" y="211166"/>
-            <a:ext cx="7837402" cy="769441"/>
-          </a:xfrm>
-          <a:prstGeom prst="rect">
-            <a:avLst/>
-          </a:prstGeom>
-          <a:noFill/>
-        </p:spPr>
-        <p:txBody>
-          <a:bodyPr wrap="none" lIns="91440" tIns="45720" rIns="91440" bIns="45720">
-            <a:spAutoFit/>
-          </a:bodyPr>
-          <a:lstStyle/>
-          <a:p>
-            <a:r>
-              <a:rPr lang="en-US" sz="4400" dirty="0">
-                <a:ln w="0"/>
-                <a:solidFill>
-                  <a:schemeClr val="bg1"/>
-                </a:solidFill>
-                <a:effectLst>
-                  <a:outerShdw blurRad="38100" dist="19050" dir="2700000" algn="tl" rotWithShape="0">
-                    <a:schemeClr val="dk1">
-                      <a:alpha val="40000"/>
-                    </a:schemeClr>
-                  </a:outerShdw>
-                </a:effectLst>
-                <a:latin typeface="Fira Code SemiBold" panose="020B0809050000020004" pitchFamily="49" charset="0"/>
-                <a:ea typeface="Fira Code SemiBold" panose="020B0809050000020004" pitchFamily="49" charset="0"/>
-              </a:rPr>
-              <a:t>Read first few columns</a:t>
-            </a:r>
-            <a:endParaRPr lang="en-US" sz="4400" b="0" cap="none" spc="0" dirty="0">
-              <a:ln w="0"/>
-              <a:solidFill>
-                <a:schemeClr val="bg1"/>
-              </a:solidFill>
-              <a:effectLst>
-                <a:outerShdw blurRad="38100" dist="19050" dir="2700000" algn="tl" rotWithShape="0">
-                  <a:schemeClr val="dk1">
-                    <a:alpha val="40000"/>
-                  </a:schemeClr>
-                </a:outerShdw>
-              </a:effectLst>
-              <a:latin typeface="Fira Code SemiBold" panose="020B0809050000020004" pitchFamily="49" charset="0"/>
-              <a:ea typeface="Fira Code SemiBold" panose="020B0809050000020004" pitchFamily="49" charset="0"/>
-            </a:endParaRPr>
-          </a:p>
-        </p:txBody>
-      </p:sp>
-      <p:pic>
-        <p:nvPicPr>
-          <p:cNvPr id="6" name="Picture 5">
-            <a:extLst>
-              <a:ext uri="{FF2B5EF4-FFF2-40B4-BE49-F238E27FC236}">
-                <a16:creationId xmlns:a16="http://schemas.microsoft.com/office/drawing/2014/main" id="{947685FF-48F7-541B-0F0E-8A1E167EF325}"/>
-              </a:ext>
-            </a:extLst>
-          </p:cNvPr>
-          <p:cNvPicPr>
-            <a:picLocks noChangeAspect="1"/>
-          </p:cNvPicPr>
-          <p:nvPr/>
-        </p:nvPicPr>
-        <p:blipFill>
-          <a:blip r:embed="rId4">
-            <a:extLst>
-              <a:ext uri="{28A0092B-C50C-407E-A947-70E740481C1C}">
-                <a14:useLocalDpi xmlns:a14="http://schemas.microsoft.com/office/drawing/2010/main" val="0"/>
-              </a:ext>
-            </a:extLst>
-          </a:blip>
-          <a:stretch>
-            <a:fillRect/>
-          </a:stretch>
-        </p:blipFill>
-        <p:spPr>
-          <a:xfrm>
-            <a:off x="8232321" y="-109345"/>
-            <a:ext cx="3959679" cy="6858000"/>
-          </a:xfrm>
-          <a:prstGeom prst="rect">
-            <a:avLst/>
-          </a:prstGeom>
-        </p:spPr>
-      </p:pic>
-      <p:pic>
-        <p:nvPicPr>
-          <p:cNvPr id="7" name="Picture 6">
-            <a:extLst>
-              <a:ext uri="{FF2B5EF4-FFF2-40B4-BE49-F238E27FC236}">
-                <a16:creationId xmlns:a16="http://schemas.microsoft.com/office/drawing/2014/main" id="{6C66B0CC-09F4-65BE-F00A-D68C25F9083B}"/>
-              </a:ext>
-            </a:extLst>
-          </p:cNvPr>
-          <p:cNvPicPr>
-            <a:picLocks noChangeAspect="1"/>
-          </p:cNvPicPr>
-          <p:nvPr/>
-        </p:nvPicPr>
-        <p:blipFill>
-          <a:blip r:embed="rId5">
-            <a:extLst>
-              <a:ext uri="{28A0092B-C50C-407E-A947-70E740481C1C}">
-                <a14:useLocalDpi xmlns:a14="http://schemas.microsoft.com/office/drawing/2010/main" val="0"/>
-              </a:ext>
-            </a:extLst>
-          </a:blip>
-          <a:stretch>
-            <a:fillRect/>
-          </a:stretch>
-        </p:blipFill>
-        <p:spPr>
-          <a:xfrm>
-            <a:off x="-436473" y="358219"/>
-            <a:ext cx="9388492" cy="6858000"/>
-          </a:xfrm>
-          <a:prstGeom prst="rect">
-            <a:avLst/>
-          </a:prstGeom>
-        </p:spPr>
-      </p:pic>
-    </p:spTree>
-    <p:extLst>
-      <p:ext uri="{BB962C8B-B14F-4D97-AF65-F5344CB8AC3E}">
-        <p14:creationId xmlns:p14="http://schemas.microsoft.com/office/powerpoint/2010/main" val="1186084213"/>
-      </p:ext>
-    </p:extLst>
-  </p:cSld>
-  <p:clrMapOvr>
-    <a:masterClrMapping/>
-  </p:clrMapOvr>
-  <p:transition>
-    <p:fade/>
-  </p:transition>
-</p:sld>
-</file>
-
 <file path=ppt/slides/slide39.xml><?xml version="1.0" encoding="utf-8"?>
 <p:sld xmlns:a="http://schemas.openxmlformats.org/drawingml/2006/main" xmlns:r="http://schemas.openxmlformats.org/officeDocument/2006/relationships" xmlns:p="http://schemas.openxmlformats.org/presentationml/2006/main">
   <p:cSld>
@@ -19633,10 +19891,10 @@
       </p:sp>
       <p:pic>
         <p:nvPicPr>
-          <p:cNvPr id="9" name="Picture 8">
+          <p:cNvPr id="6" name="Picture 5">
             <a:extLst>
               <a:ext uri="{FF2B5EF4-FFF2-40B4-BE49-F238E27FC236}">
-                <a16:creationId xmlns:a16="http://schemas.microsoft.com/office/drawing/2014/main" id="{431CADBF-E108-798C-A9D4-06E1E63A394B}"/>
+                <a16:creationId xmlns:a16="http://schemas.microsoft.com/office/drawing/2014/main" id="{947685FF-48F7-541B-0F0E-8A1E167EF325}"/>
               </a:ext>
             </a:extLst>
           </p:cNvPr>
@@ -19669,10 +19927,10 @@
       </p:pic>
       <p:pic>
         <p:nvPicPr>
-          <p:cNvPr id="3" name="Picture 2">
+          <p:cNvPr id="7" name="Picture 6">
             <a:extLst>
               <a:ext uri="{FF2B5EF4-FFF2-40B4-BE49-F238E27FC236}">
-                <a16:creationId xmlns:a16="http://schemas.microsoft.com/office/drawing/2014/main" id="{BFF9E903-B99A-8A92-F1E6-9D3E1138D84F}"/>
+                <a16:creationId xmlns:a16="http://schemas.microsoft.com/office/drawing/2014/main" id="{6C66B0CC-09F4-65BE-F00A-D68C25F9083B}"/>
               </a:ext>
             </a:extLst>
           </p:cNvPr>
@@ -19703,218 +19961,10 @@
           </a:prstGeom>
         </p:spPr>
       </p:pic>
-      <p:sp>
-        <p:nvSpPr>
-          <p:cNvPr id="7" name="Freeform: Shape 6">
-            <a:extLst>
-              <a:ext uri="{FF2B5EF4-FFF2-40B4-BE49-F238E27FC236}">
-                <a16:creationId xmlns:a16="http://schemas.microsoft.com/office/drawing/2014/main" id="{3528454C-179B-1FB9-3FD9-7FE8469F9320}"/>
-              </a:ext>
-            </a:extLst>
-          </p:cNvPr>
-          <p:cNvSpPr/>
-          <p:nvPr/>
-        </p:nvSpPr>
-        <p:spPr>
-          <a:xfrm>
-            <a:off x="0" y="0"/>
-            <a:ext cx="12192000" cy="6858000"/>
-          </a:xfrm>
-          <a:custGeom>
-            <a:avLst/>
-            <a:gdLst>
-              <a:gd name="connsiteX0" fmla="*/ 735291 w 12192000"/>
-              <a:gd name="connsiteY0" fmla="*/ 2969443 h 6858000"/>
-              <a:gd name="connsiteX1" fmla="*/ 735291 w 12192000"/>
-              <a:gd name="connsiteY1" fmla="*/ 3738884 h 6858000"/>
-              <a:gd name="connsiteX2" fmla="*/ 7843101 w 12192000"/>
-              <a:gd name="connsiteY2" fmla="*/ 3738884 h 6858000"/>
-              <a:gd name="connsiteX3" fmla="*/ 7843101 w 12192000"/>
-              <a:gd name="connsiteY3" fmla="*/ 2969443 h 6858000"/>
-              <a:gd name="connsiteX4" fmla="*/ 0 w 12192000"/>
-              <a:gd name="connsiteY4" fmla="*/ 0 h 6858000"/>
-              <a:gd name="connsiteX5" fmla="*/ 12192000 w 12192000"/>
-              <a:gd name="connsiteY5" fmla="*/ 0 h 6858000"/>
-              <a:gd name="connsiteX6" fmla="*/ 12192000 w 12192000"/>
-              <a:gd name="connsiteY6" fmla="*/ 6858000 h 6858000"/>
-              <a:gd name="connsiteX7" fmla="*/ 0 w 12192000"/>
-              <a:gd name="connsiteY7" fmla="*/ 6858000 h 6858000"/>
-            </a:gdLst>
-            <a:ahLst/>
-            <a:cxnLst>
-              <a:cxn ang="0">
-                <a:pos x="connsiteX0" y="connsiteY0"/>
-              </a:cxn>
-              <a:cxn ang="0">
-                <a:pos x="connsiteX1" y="connsiteY1"/>
-              </a:cxn>
-              <a:cxn ang="0">
-                <a:pos x="connsiteX2" y="connsiteY2"/>
-              </a:cxn>
-              <a:cxn ang="0">
-                <a:pos x="connsiteX3" y="connsiteY3"/>
-              </a:cxn>
-              <a:cxn ang="0">
-                <a:pos x="connsiteX4" y="connsiteY4"/>
-              </a:cxn>
-              <a:cxn ang="0">
-                <a:pos x="connsiteX5" y="connsiteY5"/>
-              </a:cxn>
-              <a:cxn ang="0">
-                <a:pos x="connsiteX6" y="connsiteY6"/>
-              </a:cxn>
-              <a:cxn ang="0">
-                <a:pos x="connsiteX7" y="connsiteY7"/>
-              </a:cxn>
-            </a:cxnLst>
-            <a:rect l="l" t="t" r="r" b="b"/>
-            <a:pathLst>
-              <a:path w="12192000" h="6858000">
-                <a:moveTo>
-                  <a:pt x="735291" y="2969443"/>
-                </a:moveTo>
-                <a:lnTo>
-                  <a:pt x="735291" y="3738884"/>
-                </a:lnTo>
-                <a:lnTo>
-                  <a:pt x="7843101" y="3738884"/>
-                </a:lnTo>
-                <a:lnTo>
-                  <a:pt x="7843101" y="2969443"/>
-                </a:lnTo>
-                <a:close/>
-                <a:moveTo>
-                  <a:pt x="0" y="0"/>
-                </a:moveTo>
-                <a:lnTo>
-                  <a:pt x="12192000" y="0"/>
-                </a:lnTo>
-                <a:lnTo>
-                  <a:pt x="12192000" y="6858000"/>
-                </a:lnTo>
-                <a:lnTo>
-                  <a:pt x="0" y="6858000"/>
-                </a:lnTo>
-                <a:close/>
-              </a:path>
-            </a:pathLst>
-          </a:custGeom>
-          <a:solidFill>
-            <a:schemeClr val="tx1">
-              <a:alpha val="66000"/>
-            </a:schemeClr>
-          </a:solidFill>
-          <a:ln>
-            <a:noFill/>
-          </a:ln>
-        </p:spPr>
-        <p:style>
-          <a:lnRef idx="2">
-            <a:schemeClr val="accent1">
-              <a:shade val="50000"/>
-            </a:schemeClr>
-          </a:lnRef>
-          <a:fillRef idx="1">
-            <a:schemeClr val="accent1"/>
-          </a:fillRef>
-          <a:effectRef idx="0">
-            <a:schemeClr val="accent1"/>
-          </a:effectRef>
-          <a:fontRef idx="minor">
-            <a:schemeClr val="lt1"/>
-          </a:fontRef>
-        </p:style>
-        <p:txBody>
-          <a:bodyPr wrap="square" rtlCol="0" anchor="ctr">
-            <a:noAutofit/>
-          </a:bodyPr>
-          <a:lstStyle/>
-          <a:p>
-            <a:pPr algn="ctr"/>
-            <a:endParaRPr lang="en-IN" dirty="0"/>
-          </a:p>
-        </p:txBody>
-      </p:sp>
-      <p:sp>
-        <p:nvSpPr>
-          <p:cNvPr id="8" name="Rectangle: Rounded Corners 7">
-            <a:extLst>
-              <a:ext uri="{FF2B5EF4-FFF2-40B4-BE49-F238E27FC236}">
-                <a16:creationId xmlns:a16="http://schemas.microsoft.com/office/drawing/2014/main" id="{FA3E9A24-EB57-DEC0-F923-17F4BBE7ABB1}"/>
-              </a:ext>
-            </a:extLst>
-          </p:cNvPr>
-          <p:cNvSpPr/>
-          <p:nvPr/>
-        </p:nvSpPr>
-        <p:spPr>
-          <a:xfrm>
-            <a:off x="4633448" y="1161811"/>
-            <a:ext cx="4355245" cy="1808798"/>
-          </a:xfrm>
-          <a:prstGeom prst="roundRect">
-            <a:avLst>
-              <a:gd name="adj" fmla="val 29524"/>
-            </a:avLst>
-          </a:prstGeom>
-          <a:noFill/>
-          <a:ln>
-            <a:solidFill>
-              <a:schemeClr val="bg1"/>
-            </a:solidFill>
-          </a:ln>
-        </p:spPr>
-        <p:style>
-          <a:lnRef idx="2">
-            <a:schemeClr val="accent1">
-              <a:shade val="50000"/>
-            </a:schemeClr>
-          </a:lnRef>
-          <a:fillRef idx="1">
-            <a:schemeClr val="accent1"/>
-          </a:fillRef>
-          <a:effectRef idx="0">
-            <a:schemeClr val="accent1"/>
-          </a:effectRef>
-          <a:fontRef idx="minor">
-            <a:schemeClr val="lt1"/>
-          </a:fontRef>
-        </p:style>
-        <p:txBody>
-          <a:bodyPr rtlCol="0" anchor="ctr"/>
-          <a:lstStyle/>
-          <a:p>
-            <a:pPr marL="171450" indent="-171450">
-              <a:buFont typeface="Arial" panose="020B0604020202020204" pitchFamily="34" charset="0"/>
-              <a:buChar char="•"/>
-            </a:pPr>
-            <a:r>
-              <a:rPr lang="en-US" sz="1300" dirty="0">
-                <a:latin typeface="Fira Code SemiBold" panose="020B0809050000020004" pitchFamily="49" charset="0"/>
-                <a:ea typeface="Fira Code SemiBold" panose="020B0809050000020004" pitchFamily="49" charset="0"/>
-              </a:rPr>
-              <a:t>As number of variables defined is less than the number of columns, all remaining fields are assigned to the last variable</a:t>
-            </a:r>
-          </a:p>
-          <a:p>
-            <a:pPr marL="171450" indent="-171450">
-              <a:buFont typeface="Arial" panose="020B0604020202020204" pitchFamily="34" charset="0"/>
-              <a:buChar char="•"/>
-            </a:pPr>
-            <a:r>
-              <a:rPr lang="en-US" sz="1300" dirty="0">
-                <a:latin typeface="Fira Code SemiBold" panose="020B0809050000020004" pitchFamily="49" charset="0"/>
-                <a:ea typeface="Fira Code SemiBold" panose="020B0809050000020004" pitchFamily="49" charset="0"/>
-              </a:rPr>
-              <a:t>In fact, if there are (x) variables, the line is split (x-1) times, giving (x) tokens </a:t>
-            </a:r>
-          </a:p>
-        </p:txBody>
-      </p:sp>
     </p:spTree>
     <p:extLst>
       <p:ext uri="{BB962C8B-B14F-4D97-AF65-F5344CB8AC3E}">
-        <p14:creationId xmlns:p14="http://schemas.microsoft.com/office/powerpoint/2010/main" val="3547705322"/>
+        <p14:creationId xmlns:p14="http://schemas.microsoft.com/office/powerpoint/2010/main" val="1186084213"/>
       </p:ext>
     </p:extLst>
   </p:cSld>
@@ -19924,95 +19974,6 @@
   <p:transition>
     <p:fade/>
   </p:transition>
-  <p:timing>
-    <p:tnLst>
-      <p:par>
-        <p:cTn id="1" dur="indefinite" restart="never" nodeType="tmRoot">
-          <p:childTnLst>
-            <p:seq concurrent="1" nextAc="seek">
-              <p:cTn id="2" dur="indefinite" nodeType="mainSeq">
-                <p:childTnLst>
-                  <p:par>
-                    <p:cTn id="3" fill="hold">
-                      <p:stCondLst>
-                        <p:cond delay="indefinite"/>
-                        <p:cond evt="onBegin" delay="0">
-                          <p:tn val="2"/>
-                        </p:cond>
-                      </p:stCondLst>
-                      <p:childTnLst>
-                        <p:par>
-                          <p:cTn id="4" fill="hold">
-                            <p:stCondLst>
-                              <p:cond delay="0"/>
-                            </p:stCondLst>
-                            <p:childTnLst>
-                              <p:par>
-                                <p:cTn id="5" presetID="10" presetClass="entr" presetSubtype="0" fill="hold" grpId="0" nodeType="withEffect">
-                                  <p:stCondLst>
-                                    <p:cond delay="0"/>
-                                  </p:stCondLst>
-                                  <p:childTnLst>
-                                    <p:set>
-                                      <p:cBhvr>
-                                        <p:cTn id="6" dur="1" fill="hold">
-                                          <p:stCondLst>
-                                            <p:cond delay="0"/>
-                                          </p:stCondLst>
-                                        </p:cTn>
-                                        <p:tgtEl>
-                                          <p:spTgt spid="8"/>
-                                        </p:tgtEl>
-                                        <p:attrNameLst>
-                                          <p:attrName>style.visibility</p:attrName>
-                                        </p:attrNameLst>
-                                      </p:cBhvr>
-                                      <p:to>
-                                        <p:strVal val="visible"/>
-                                      </p:to>
-                                    </p:set>
-                                    <p:animEffect transition="in" filter="fade">
-                                      <p:cBhvr>
-                                        <p:cTn id="7" dur="500"/>
-                                        <p:tgtEl>
-                                          <p:spTgt spid="8"/>
-                                        </p:tgtEl>
-                                      </p:cBhvr>
-                                    </p:animEffect>
-                                  </p:childTnLst>
-                                </p:cTn>
-                              </p:par>
-                            </p:childTnLst>
-                          </p:cTn>
-                        </p:par>
-                      </p:childTnLst>
-                    </p:cTn>
-                  </p:par>
-                </p:childTnLst>
-              </p:cTn>
-              <p:prevCondLst>
-                <p:cond evt="onPrev" delay="0">
-                  <p:tgtEl>
-                    <p:sldTgt/>
-                  </p:tgtEl>
-                </p:cond>
-              </p:prevCondLst>
-              <p:nextCondLst>
-                <p:cond evt="onNext" delay="0">
-                  <p:tgtEl>
-                    <p:sldTgt/>
-                  </p:tgtEl>
-                </p:cond>
-              </p:nextCondLst>
-            </p:seq>
-          </p:childTnLst>
-        </p:cTn>
-      </p:par>
-    </p:tnLst>
-    <p:bldLst>
-      <p:bldP spid="8" grpId="0" animBg="1"/>
-    </p:bldLst>
-  </p:timing>
 </p:sld>
 </file>
 
@@ -21361,6 +21322,486 @@
           <a:chExt cx="0" cy="0"/>
         </a:xfrm>
       </p:grpSpPr>
+      <p:sp>
+        <p:nvSpPr>
+          <p:cNvPr id="2" name="Rectangle 1">
+            <a:extLst>
+              <a:ext uri="{FF2B5EF4-FFF2-40B4-BE49-F238E27FC236}">
+                <a16:creationId xmlns:a16="http://schemas.microsoft.com/office/drawing/2014/main" id="{E519822D-3C02-FE88-8748-DC75115DA964}"/>
+              </a:ext>
+            </a:extLst>
+          </p:cNvPr>
+          <p:cNvSpPr/>
+          <p:nvPr/>
+        </p:nvSpPr>
+        <p:spPr>
+          <a:xfrm>
+            <a:off x="89587" y="211166"/>
+            <a:ext cx="7837402" cy="769441"/>
+          </a:xfrm>
+          <a:prstGeom prst="rect">
+            <a:avLst/>
+          </a:prstGeom>
+          <a:noFill/>
+        </p:spPr>
+        <p:txBody>
+          <a:bodyPr wrap="none" lIns="91440" tIns="45720" rIns="91440" bIns="45720">
+            <a:spAutoFit/>
+          </a:bodyPr>
+          <a:lstStyle/>
+          <a:p>
+            <a:r>
+              <a:rPr lang="en-US" sz="4400" dirty="0">
+                <a:ln w="0"/>
+                <a:solidFill>
+                  <a:schemeClr val="bg1"/>
+                </a:solidFill>
+                <a:effectLst>
+                  <a:outerShdw blurRad="38100" dist="19050" dir="2700000" algn="tl" rotWithShape="0">
+                    <a:schemeClr val="dk1">
+                      <a:alpha val="40000"/>
+                    </a:schemeClr>
+                  </a:outerShdw>
+                </a:effectLst>
+                <a:latin typeface="Fira Code SemiBold" panose="020B0809050000020004" pitchFamily="49" charset="0"/>
+                <a:ea typeface="Fira Code SemiBold" panose="020B0809050000020004" pitchFamily="49" charset="0"/>
+              </a:rPr>
+              <a:t>Read first few columns</a:t>
+            </a:r>
+            <a:endParaRPr lang="en-US" sz="4400" b="0" cap="none" spc="0" dirty="0">
+              <a:ln w="0"/>
+              <a:solidFill>
+                <a:schemeClr val="bg1"/>
+              </a:solidFill>
+              <a:effectLst>
+                <a:outerShdw blurRad="38100" dist="19050" dir="2700000" algn="tl" rotWithShape="0">
+                  <a:schemeClr val="dk1">
+                    <a:alpha val="40000"/>
+                  </a:schemeClr>
+                </a:outerShdw>
+              </a:effectLst>
+              <a:latin typeface="Fira Code SemiBold" panose="020B0809050000020004" pitchFamily="49" charset="0"/>
+              <a:ea typeface="Fira Code SemiBold" panose="020B0809050000020004" pitchFamily="49" charset="0"/>
+            </a:endParaRPr>
+          </a:p>
+        </p:txBody>
+      </p:sp>
+      <p:pic>
+        <p:nvPicPr>
+          <p:cNvPr id="9" name="Picture 8">
+            <a:extLst>
+              <a:ext uri="{FF2B5EF4-FFF2-40B4-BE49-F238E27FC236}">
+                <a16:creationId xmlns:a16="http://schemas.microsoft.com/office/drawing/2014/main" id="{431CADBF-E108-798C-A9D4-06E1E63A394B}"/>
+              </a:ext>
+            </a:extLst>
+          </p:cNvPr>
+          <p:cNvPicPr>
+            <a:picLocks noChangeAspect="1"/>
+          </p:cNvPicPr>
+          <p:nvPr/>
+        </p:nvPicPr>
+        <p:blipFill>
+          <a:blip r:embed="rId4">
+            <a:extLst>
+              <a:ext uri="{28A0092B-C50C-407E-A947-70E740481C1C}">
+                <a14:useLocalDpi xmlns:a14="http://schemas.microsoft.com/office/drawing/2010/main" val="0"/>
+              </a:ext>
+            </a:extLst>
+          </a:blip>
+          <a:stretch>
+            <a:fillRect/>
+          </a:stretch>
+        </p:blipFill>
+        <p:spPr>
+          <a:xfrm>
+            <a:off x="8232321" y="-109345"/>
+            <a:ext cx="3959679" cy="6858000"/>
+          </a:xfrm>
+          <a:prstGeom prst="rect">
+            <a:avLst/>
+          </a:prstGeom>
+        </p:spPr>
+      </p:pic>
+      <p:pic>
+        <p:nvPicPr>
+          <p:cNvPr id="3" name="Picture 2">
+            <a:extLst>
+              <a:ext uri="{FF2B5EF4-FFF2-40B4-BE49-F238E27FC236}">
+                <a16:creationId xmlns:a16="http://schemas.microsoft.com/office/drawing/2014/main" id="{BFF9E903-B99A-8A92-F1E6-9D3E1138D84F}"/>
+              </a:ext>
+            </a:extLst>
+          </p:cNvPr>
+          <p:cNvPicPr>
+            <a:picLocks noChangeAspect="1"/>
+          </p:cNvPicPr>
+          <p:nvPr/>
+        </p:nvPicPr>
+        <p:blipFill>
+          <a:blip r:embed="rId5">
+            <a:extLst>
+              <a:ext uri="{28A0092B-C50C-407E-A947-70E740481C1C}">
+                <a14:useLocalDpi xmlns:a14="http://schemas.microsoft.com/office/drawing/2010/main" val="0"/>
+              </a:ext>
+            </a:extLst>
+          </a:blip>
+          <a:stretch>
+            <a:fillRect/>
+          </a:stretch>
+        </p:blipFill>
+        <p:spPr>
+          <a:xfrm>
+            <a:off x="-436473" y="358219"/>
+            <a:ext cx="9388492" cy="6858000"/>
+          </a:xfrm>
+          <a:prstGeom prst="rect">
+            <a:avLst/>
+          </a:prstGeom>
+        </p:spPr>
+      </p:pic>
+      <p:sp>
+        <p:nvSpPr>
+          <p:cNvPr id="7" name="Freeform: Shape 6">
+            <a:extLst>
+              <a:ext uri="{FF2B5EF4-FFF2-40B4-BE49-F238E27FC236}">
+                <a16:creationId xmlns:a16="http://schemas.microsoft.com/office/drawing/2014/main" id="{3528454C-179B-1FB9-3FD9-7FE8469F9320}"/>
+              </a:ext>
+            </a:extLst>
+          </p:cNvPr>
+          <p:cNvSpPr/>
+          <p:nvPr/>
+        </p:nvSpPr>
+        <p:spPr>
+          <a:xfrm>
+            <a:off x="0" y="0"/>
+            <a:ext cx="12192000" cy="6858000"/>
+          </a:xfrm>
+          <a:custGeom>
+            <a:avLst/>
+            <a:gdLst>
+              <a:gd name="connsiteX0" fmla="*/ 735291 w 12192000"/>
+              <a:gd name="connsiteY0" fmla="*/ 2969443 h 6858000"/>
+              <a:gd name="connsiteX1" fmla="*/ 735291 w 12192000"/>
+              <a:gd name="connsiteY1" fmla="*/ 3738884 h 6858000"/>
+              <a:gd name="connsiteX2" fmla="*/ 7843101 w 12192000"/>
+              <a:gd name="connsiteY2" fmla="*/ 3738884 h 6858000"/>
+              <a:gd name="connsiteX3" fmla="*/ 7843101 w 12192000"/>
+              <a:gd name="connsiteY3" fmla="*/ 2969443 h 6858000"/>
+              <a:gd name="connsiteX4" fmla="*/ 0 w 12192000"/>
+              <a:gd name="connsiteY4" fmla="*/ 0 h 6858000"/>
+              <a:gd name="connsiteX5" fmla="*/ 12192000 w 12192000"/>
+              <a:gd name="connsiteY5" fmla="*/ 0 h 6858000"/>
+              <a:gd name="connsiteX6" fmla="*/ 12192000 w 12192000"/>
+              <a:gd name="connsiteY6" fmla="*/ 6858000 h 6858000"/>
+              <a:gd name="connsiteX7" fmla="*/ 0 w 12192000"/>
+              <a:gd name="connsiteY7" fmla="*/ 6858000 h 6858000"/>
+            </a:gdLst>
+            <a:ahLst/>
+            <a:cxnLst>
+              <a:cxn ang="0">
+                <a:pos x="connsiteX0" y="connsiteY0"/>
+              </a:cxn>
+              <a:cxn ang="0">
+                <a:pos x="connsiteX1" y="connsiteY1"/>
+              </a:cxn>
+              <a:cxn ang="0">
+                <a:pos x="connsiteX2" y="connsiteY2"/>
+              </a:cxn>
+              <a:cxn ang="0">
+                <a:pos x="connsiteX3" y="connsiteY3"/>
+              </a:cxn>
+              <a:cxn ang="0">
+                <a:pos x="connsiteX4" y="connsiteY4"/>
+              </a:cxn>
+              <a:cxn ang="0">
+                <a:pos x="connsiteX5" y="connsiteY5"/>
+              </a:cxn>
+              <a:cxn ang="0">
+                <a:pos x="connsiteX6" y="connsiteY6"/>
+              </a:cxn>
+              <a:cxn ang="0">
+                <a:pos x="connsiteX7" y="connsiteY7"/>
+              </a:cxn>
+            </a:cxnLst>
+            <a:rect l="l" t="t" r="r" b="b"/>
+            <a:pathLst>
+              <a:path w="12192000" h="6858000">
+                <a:moveTo>
+                  <a:pt x="735291" y="2969443"/>
+                </a:moveTo>
+                <a:lnTo>
+                  <a:pt x="735291" y="3738884"/>
+                </a:lnTo>
+                <a:lnTo>
+                  <a:pt x="7843101" y="3738884"/>
+                </a:lnTo>
+                <a:lnTo>
+                  <a:pt x="7843101" y="2969443"/>
+                </a:lnTo>
+                <a:close/>
+                <a:moveTo>
+                  <a:pt x="0" y="0"/>
+                </a:moveTo>
+                <a:lnTo>
+                  <a:pt x="12192000" y="0"/>
+                </a:lnTo>
+                <a:lnTo>
+                  <a:pt x="12192000" y="6858000"/>
+                </a:lnTo>
+                <a:lnTo>
+                  <a:pt x="0" y="6858000"/>
+                </a:lnTo>
+                <a:close/>
+              </a:path>
+            </a:pathLst>
+          </a:custGeom>
+          <a:solidFill>
+            <a:schemeClr val="tx1">
+              <a:alpha val="66000"/>
+            </a:schemeClr>
+          </a:solidFill>
+          <a:ln>
+            <a:noFill/>
+          </a:ln>
+        </p:spPr>
+        <p:style>
+          <a:lnRef idx="2">
+            <a:schemeClr val="accent1">
+              <a:shade val="50000"/>
+            </a:schemeClr>
+          </a:lnRef>
+          <a:fillRef idx="1">
+            <a:schemeClr val="accent1"/>
+          </a:fillRef>
+          <a:effectRef idx="0">
+            <a:schemeClr val="accent1"/>
+          </a:effectRef>
+          <a:fontRef idx="minor">
+            <a:schemeClr val="lt1"/>
+          </a:fontRef>
+        </p:style>
+        <p:txBody>
+          <a:bodyPr wrap="square" rtlCol="0" anchor="ctr">
+            <a:noAutofit/>
+          </a:bodyPr>
+          <a:lstStyle/>
+          <a:p>
+            <a:pPr algn="ctr"/>
+            <a:endParaRPr lang="en-IN" dirty="0"/>
+          </a:p>
+        </p:txBody>
+      </p:sp>
+      <p:sp>
+        <p:nvSpPr>
+          <p:cNvPr id="8" name="Rectangle: Rounded Corners 7">
+            <a:extLst>
+              <a:ext uri="{FF2B5EF4-FFF2-40B4-BE49-F238E27FC236}">
+                <a16:creationId xmlns:a16="http://schemas.microsoft.com/office/drawing/2014/main" id="{FA3E9A24-EB57-DEC0-F923-17F4BBE7ABB1}"/>
+              </a:ext>
+            </a:extLst>
+          </p:cNvPr>
+          <p:cNvSpPr/>
+          <p:nvPr/>
+        </p:nvSpPr>
+        <p:spPr>
+          <a:xfrm>
+            <a:off x="4633448" y="1161811"/>
+            <a:ext cx="4355245" cy="1808798"/>
+          </a:xfrm>
+          <a:prstGeom prst="roundRect">
+            <a:avLst>
+              <a:gd name="adj" fmla="val 29524"/>
+            </a:avLst>
+          </a:prstGeom>
+          <a:noFill/>
+          <a:ln>
+            <a:solidFill>
+              <a:schemeClr val="bg1"/>
+            </a:solidFill>
+          </a:ln>
+        </p:spPr>
+        <p:style>
+          <a:lnRef idx="2">
+            <a:schemeClr val="accent1">
+              <a:shade val="50000"/>
+            </a:schemeClr>
+          </a:lnRef>
+          <a:fillRef idx="1">
+            <a:schemeClr val="accent1"/>
+          </a:fillRef>
+          <a:effectRef idx="0">
+            <a:schemeClr val="accent1"/>
+          </a:effectRef>
+          <a:fontRef idx="minor">
+            <a:schemeClr val="lt1"/>
+          </a:fontRef>
+        </p:style>
+        <p:txBody>
+          <a:bodyPr rtlCol="0" anchor="ctr"/>
+          <a:lstStyle/>
+          <a:p>
+            <a:pPr marL="171450" indent="-171450">
+              <a:buFont typeface="Arial" panose="020B0604020202020204" pitchFamily="34" charset="0"/>
+              <a:buChar char="•"/>
+            </a:pPr>
+            <a:r>
+              <a:rPr lang="en-US" sz="1300" dirty="0">
+                <a:latin typeface="Fira Code SemiBold" panose="020B0809050000020004" pitchFamily="49" charset="0"/>
+                <a:ea typeface="Fira Code SemiBold" panose="020B0809050000020004" pitchFamily="49" charset="0"/>
+              </a:rPr>
+              <a:t>As number of variables defined is less than the number of columns, all remaining fields are assigned to the last variable</a:t>
+            </a:r>
+          </a:p>
+          <a:p>
+            <a:pPr marL="171450" indent="-171450">
+              <a:buFont typeface="Arial" panose="020B0604020202020204" pitchFamily="34" charset="0"/>
+              <a:buChar char="•"/>
+            </a:pPr>
+            <a:r>
+              <a:rPr lang="en-US" sz="1300" dirty="0">
+                <a:latin typeface="Fira Code SemiBold" panose="020B0809050000020004" pitchFamily="49" charset="0"/>
+                <a:ea typeface="Fira Code SemiBold" panose="020B0809050000020004" pitchFamily="49" charset="0"/>
+              </a:rPr>
+              <a:t>In fact, if there are (x) variables, the line is split (x-1) times, giving (x) tokens </a:t>
+            </a:r>
+          </a:p>
+        </p:txBody>
+      </p:sp>
+    </p:spTree>
+    <p:extLst>
+      <p:ext uri="{BB962C8B-B14F-4D97-AF65-F5344CB8AC3E}">
+        <p14:creationId xmlns:p14="http://schemas.microsoft.com/office/powerpoint/2010/main" val="3547705322"/>
+      </p:ext>
+    </p:extLst>
+  </p:cSld>
+  <p:clrMapOvr>
+    <a:masterClrMapping/>
+  </p:clrMapOvr>
+  <p:transition>
+    <p:fade/>
+  </p:transition>
+  <p:timing>
+    <p:tnLst>
+      <p:par>
+        <p:cTn id="1" dur="indefinite" restart="never" nodeType="tmRoot">
+          <p:childTnLst>
+            <p:seq concurrent="1" nextAc="seek">
+              <p:cTn id="2" dur="indefinite" nodeType="mainSeq">
+                <p:childTnLst>
+                  <p:par>
+                    <p:cTn id="3" fill="hold">
+                      <p:stCondLst>
+                        <p:cond delay="indefinite"/>
+                        <p:cond evt="onBegin" delay="0">
+                          <p:tn val="2"/>
+                        </p:cond>
+                      </p:stCondLst>
+                      <p:childTnLst>
+                        <p:par>
+                          <p:cTn id="4" fill="hold">
+                            <p:stCondLst>
+                              <p:cond delay="0"/>
+                            </p:stCondLst>
+                            <p:childTnLst>
+                              <p:par>
+                                <p:cTn id="5" presetID="10" presetClass="entr" presetSubtype="0" fill="hold" grpId="0" nodeType="withEffect">
+                                  <p:stCondLst>
+                                    <p:cond delay="0"/>
+                                  </p:stCondLst>
+                                  <p:childTnLst>
+                                    <p:set>
+                                      <p:cBhvr>
+                                        <p:cTn id="6" dur="1" fill="hold">
+                                          <p:stCondLst>
+                                            <p:cond delay="0"/>
+                                          </p:stCondLst>
+                                        </p:cTn>
+                                        <p:tgtEl>
+                                          <p:spTgt spid="8"/>
+                                        </p:tgtEl>
+                                        <p:attrNameLst>
+                                          <p:attrName>style.visibility</p:attrName>
+                                        </p:attrNameLst>
+                                      </p:cBhvr>
+                                      <p:to>
+                                        <p:strVal val="visible"/>
+                                      </p:to>
+                                    </p:set>
+                                    <p:animEffect transition="in" filter="fade">
+                                      <p:cBhvr>
+                                        <p:cTn id="7" dur="500"/>
+                                        <p:tgtEl>
+                                          <p:spTgt spid="8"/>
+                                        </p:tgtEl>
+                                      </p:cBhvr>
+                                    </p:animEffect>
+                                  </p:childTnLst>
+                                </p:cTn>
+                              </p:par>
+                            </p:childTnLst>
+                          </p:cTn>
+                        </p:par>
+                      </p:childTnLst>
+                    </p:cTn>
+                  </p:par>
+                </p:childTnLst>
+              </p:cTn>
+              <p:prevCondLst>
+                <p:cond evt="onPrev" delay="0">
+                  <p:tgtEl>
+                    <p:sldTgt/>
+                  </p:tgtEl>
+                </p:cond>
+              </p:prevCondLst>
+              <p:nextCondLst>
+                <p:cond evt="onNext" delay="0">
+                  <p:tgtEl>
+                    <p:sldTgt/>
+                  </p:tgtEl>
+                </p:cond>
+              </p:nextCondLst>
+            </p:seq>
+          </p:childTnLst>
+        </p:cTn>
+      </p:par>
+    </p:tnLst>
+    <p:bldLst>
+      <p:bldP spid="8" grpId="0" animBg="1"/>
+    </p:bldLst>
+  </p:timing>
+</p:sld>
+</file>
+
+<file path=ppt/slides/slide41.xml><?xml version="1.0" encoding="utf-8"?>
+<p:sld xmlns:a="http://schemas.openxmlformats.org/drawingml/2006/main" xmlns:r="http://schemas.openxmlformats.org/officeDocument/2006/relationships" xmlns:p="http://schemas.openxmlformats.org/presentationml/2006/main">
+  <p:cSld>
+    <p:bg>
+      <p:bgPr>
+        <a:blipFill dpi="0" rotWithShape="1">
+          <a:blip r:embed="rId3">
+            <a:lum/>
+          </a:blip>
+          <a:srcRect/>
+          <a:stretch>
+            <a:fillRect t="-9000" b="-9000"/>
+          </a:stretch>
+        </a:blipFill>
+        <a:effectLst/>
+      </p:bgPr>
+    </p:bg>
+    <p:spTree>
+      <p:nvGrpSpPr>
+        <p:cNvPr id="1" name=""/>
+        <p:cNvGrpSpPr/>
+        <p:nvPr/>
+      </p:nvGrpSpPr>
+      <p:grpSpPr>
+        <a:xfrm>
+          <a:off x="0" y="0"/>
+          <a:ext cx="0" cy="0"/>
+          <a:chOff x="0" y="0"/>
+          <a:chExt cx="0" cy="0"/>
+        </a:xfrm>
+      </p:grpSpPr>
       <p:pic>
         <p:nvPicPr>
           <p:cNvPr id="5" name="Picture 4">
@@ -21778,7 +22219,7 @@
 </p:sld>
 </file>
 
-<file path=ppt/slides/slide41.xml><?xml version="1.0" encoding="utf-8"?>
+<file path=ppt/slides/slide42.xml><?xml version="1.0" encoding="utf-8"?>
 <p:sld xmlns:a="http://schemas.openxmlformats.org/drawingml/2006/main" xmlns:r="http://schemas.openxmlformats.org/officeDocument/2006/relationships" xmlns:p="http://schemas.openxmlformats.org/presentationml/2006/main">
   <p:cSld>
     <p:bg>
@@ -21961,7 +22402,7 @@
 </p:sld>
 </file>
 
-<file path=ppt/slides/slide42.xml><?xml version="1.0" encoding="utf-8"?>
+<file path=ppt/slides/slide43.xml><?xml version="1.0" encoding="utf-8"?>
 <p:sld xmlns:a="http://schemas.openxmlformats.org/drawingml/2006/main" xmlns:r="http://schemas.openxmlformats.org/officeDocument/2006/relationships" xmlns:p="http://schemas.openxmlformats.org/presentationml/2006/main">
   <p:cSld>
     <p:bg>
@@ -22949,7 +23390,7 @@
 </p:sld>
 </file>
 
-<file path=ppt/slides/slide43.xml><?xml version="1.0" encoding="utf-8"?>
+<file path=ppt/slides/slide44.xml><?xml version="1.0" encoding="utf-8"?>
 <p:sld xmlns:a="http://schemas.openxmlformats.org/drawingml/2006/main" xmlns:r="http://schemas.openxmlformats.org/officeDocument/2006/relationships" xmlns:p="http://schemas.openxmlformats.org/presentationml/2006/main">
   <p:cSld>
     <p:bg>
@@ -23397,7 +23838,7 @@
 </p:sld>
 </file>
 
-<file path=ppt/slides/slide44.xml><?xml version="1.0" encoding="utf-8"?>
+<file path=ppt/slides/slide45.xml><?xml version="1.0" encoding="utf-8"?>
 <p:sld xmlns:a="http://schemas.openxmlformats.org/drawingml/2006/main" xmlns:r="http://schemas.openxmlformats.org/officeDocument/2006/relationships" xmlns:p="http://schemas.openxmlformats.org/presentationml/2006/main">
   <p:cSld>
     <p:bg>
@@ -23580,7 +24021,7 @@
 </p:sld>
 </file>
 
-<file path=ppt/slides/slide45.xml><?xml version="1.0" encoding="utf-8"?>
+<file path=ppt/slides/slide46.xml><?xml version="1.0" encoding="utf-8"?>
 <p:sld xmlns:a="http://schemas.openxmlformats.org/drawingml/2006/main" xmlns:r="http://schemas.openxmlformats.org/officeDocument/2006/relationships" xmlns:p="http://schemas.openxmlformats.org/presentationml/2006/main">
   <p:cSld>
     <p:bg>
@@ -24116,7 +24557,7 @@
 </p:sld>
 </file>
 
-<file path=ppt/slides/slide46.xml><?xml version="1.0" encoding="utf-8"?>
+<file path=ppt/slides/slide47.xml><?xml version="1.0" encoding="utf-8"?>
 <p:sld xmlns:a="http://schemas.openxmlformats.org/drawingml/2006/main" xmlns:r="http://schemas.openxmlformats.org/officeDocument/2006/relationships" xmlns:p="http://schemas.openxmlformats.org/presentationml/2006/main">
   <p:cSld>
     <p:bg>
@@ -25005,7 +25446,7 @@
 </p:sld>
 </file>
 
-<file path=ppt/slides/slide47.xml><?xml version="1.0" encoding="utf-8"?>
+<file path=ppt/slides/slide48.xml><?xml version="1.0" encoding="utf-8"?>
 <p:sld xmlns:a="http://schemas.openxmlformats.org/drawingml/2006/main" xmlns:r="http://schemas.openxmlformats.org/officeDocument/2006/relationships" xmlns:p="http://schemas.openxmlformats.org/presentationml/2006/main">
   <p:cSld>
     <p:bg>
@@ -25453,7 +25894,7 @@
 </p:sld>
 </file>
 
-<file path=ppt/slides/slide48.xml><?xml version="1.0" encoding="utf-8"?>
+<file path=ppt/slides/slide49.xml><?xml version="1.0" encoding="utf-8"?>
 <p:sld xmlns:a="http://schemas.openxmlformats.org/drawingml/2006/main" xmlns:r="http://schemas.openxmlformats.org/officeDocument/2006/relationships" xmlns:p="http://schemas.openxmlformats.org/presentationml/2006/main" show="0">
   <p:cSld>
     <p:bg>
@@ -25656,502 +26097,6 @@
   <p:transition>
     <p:fade/>
   </p:transition>
-</p:sld>
-</file>
-
-<file path=ppt/slides/slide49.xml><?xml version="1.0" encoding="utf-8"?>
-<p:sld xmlns:a="http://schemas.openxmlformats.org/drawingml/2006/main" xmlns:r="http://schemas.openxmlformats.org/officeDocument/2006/relationships" xmlns:p="http://schemas.openxmlformats.org/presentationml/2006/main" show="0">
-  <p:cSld>
-    <p:bg>
-      <p:bgPr>
-        <a:blipFill dpi="0" rotWithShape="1">
-          <a:blip r:embed="rId3">
-            <a:lum/>
-          </a:blip>
-          <a:srcRect/>
-          <a:stretch>
-            <a:fillRect t="-9000" b="-9000"/>
-          </a:stretch>
-        </a:blipFill>
-        <a:effectLst/>
-      </p:bgPr>
-    </p:bg>
-    <p:spTree>
-      <p:nvGrpSpPr>
-        <p:cNvPr id="1" name=""/>
-        <p:cNvGrpSpPr/>
-        <p:nvPr/>
-      </p:nvGrpSpPr>
-      <p:grpSpPr>
-        <a:xfrm>
-          <a:off x="0" y="0"/>
-          <a:ext cx="0" cy="0"/>
-          <a:chOff x="0" y="0"/>
-          <a:chExt cx="0" cy="0"/>
-        </a:xfrm>
-      </p:grpSpPr>
-      <p:sp>
-        <p:nvSpPr>
-          <p:cNvPr id="2" name="Rectangle 1">
-            <a:extLst>
-              <a:ext uri="{FF2B5EF4-FFF2-40B4-BE49-F238E27FC236}">
-                <a16:creationId xmlns:a16="http://schemas.microsoft.com/office/drawing/2014/main" id="{E519822D-3C02-FE88-8748-DC75115DA964}"/>
-              </a:ext>
-            </a:extLst>
-          </p:cNvPr>
-          <p:cNvSpPr/>
-          <p:nvPr/>
-        </p:nvSpPr>
-        <p:spPr>
-          <a:xfrm>
-            <a:off x="118857" y="94434"/>
-            <a:ext cx="5750292" cy="1446550"/>
-          </a:xfrm>
-          <a:prstGeom prst="rect">
-            <a:avLst/>
-          </a:prstGeom>
-          <a:noFill/>
-        </p:spPr>
-        <p:txBody>
-          <a:bodyPr wrap="none" lIns="91440" tIns="45720" rIns="91440" bIns="45720">
-            <a:spAutoFit/>
-          </a:bodyPr>
-          <a:lstStyle/>
-          <a:p>
-            <a:r>
-              <a:rPr lang="en-US" sz="4400" dirty="0">
-                <a:ln w="0"/>
-                <a:solidFill>
-                  <a:schemeClr val="bg1"/>
-                </a:solidFill>
-                <a:effectLst>
-                  <a:outerShdw blurRad="38100" dist="19050" dir="2700000" algn="tl" rotWithShape="0">
-                    <a:schemeClr val="dk1">
-                      <a:alpha val="40000"/>
-                    </a:schemeClr>
-                  </a:outerShdw>
-                </a:effectLst>
-                <a:latin typeface="Fira Code SemiBold" panose="020B0809050000020004" pitchFamily="49" charset="0"/>
-                <a:ea typeface="Fira Code SemiBold" panose="020B0809050000020004" pitchFamily="49" charset="0"/>
-              </a:rPr>
-              <a:t>Another method</a:t>
-            </a:r>
-          </a:p>
-          <a:p>
-            <a:r>
-              <a:rPr lang="en-US" sz="4400" dirty="0">
-                <a:ln w="0"/>
-                <a:solidFill>
-                  <a:schemeClr val="bg1"/>
-                </a:solidFill>
-                <a:effectLst>
-                  <a:outerShdw blurRad="38100" dist="19050" dir="2700000" algn="tl" rotWithShape="0">
-                    <a:schemeClr val="dk1">
-                      <a:alpha val="40000"/>
-                    </a:schemeClr>
-                  </a:outerShdw>
-                </a:effectLst>
-                <a:latin typeface="Fira Code SemiBold" panose="020B0809050000020004" pitchFamily="49" charset="0"/>
-                <a:ea typeface="Fira Code SemiBold" panose="020B0809050000020004" pitchFamily="49" charset="0"/>
-              </a:rPr>
-              <a:t>to </a:t>
-            </a:r>
-            <a:r>
-              <a:rPr lang="en-US" sz="4400" b="0" cap="none" spc="0" dirty="0">
-                <a:ln w="0"/>
-                <a:solidFill>
-                  <a:schemeClr val="bg1"/>
-                </a:solidFill>
-                <a:effectLst>
-                  <a:outerShdw blurRad="38100" dist="19050" dir="2700000" algn="tl" rotWithShape="0">
-                    <a:schemeClr val="dk1">
-                      <a:alpha val="40000"/>
-                    </a:schemeClr>
-                  </a:outerShdw>
-                </a:effectLst>
-                <a:latin typeface="Fira Code SemiBold" panose="020B0809050000020004" pitchFamily="49" charset="0"/>
-                <a:ea typeface="Fira Code SemiBold" panose="020B0809050000020004" pitchFamily="49" charset="0"/>
-              </a:rPr>
-              <a:t>ignore Header</a:t>
-            </a:r>
-          </a:p>
-        </p:txBody>
-      </p:sp>
-      <p:pic>
-        <p:nvPicPr>
-          <p:cNvPr id="5" name="Picture 4">
-            <a:extLst>
-              <a:ext uri="{FF2B5EF4-FFF2-40B4-BE49-F238E27FC236}">
-                <a16:creationId xmlns:a16="http://schemas.microsoft.com/office/drawing/2014/main" id="{EB1CA123-E2EE-9BC1-DD8E-1952AB6C4EDD}"/>
-              </a:ext>
-            </a:extLst>
-          </p:cNvPr>
-          <p:cNvPicPr>
-            <a:picLocks noChangeAspect="1"/>
-          </p:cNvPicPr>
-          <p:nvPr/>
-        </p:nvPicPr>
-        <p:blipFill>
-          <a:blip r:embed="rId4">
-            <a:extLst>
-              <a:ext uri="{28A0092B-C50C-407E-A947-70E740481C1C}">
-                <a14:useLocalDpi xmlns:a14="http://schemas.microsoft.com/office/drawing/2010/main" val="0"/>
-              </a:ext>
-            </a:extLst>
-          </a:blip>
-          <a:stretch>
-            <a:fillRect/>
-          </a:stretch>
-        </p:blipFill>
-        <p:spPr>
-          <a:xfrm>
-            <a:off x="-413628" y="535427"/>
-            <a:ext cx="8058150" cy="6419850"/>
-          </a:xfrm>
-          <a:prstGeom prst="rect">
-            <a:avLst/>
-          </a:prstGeom>
-        </p:spPr>
-      </p:pic>
-      <p:pic>
-        <p:nvPicPr>
-          <p:cNvPr id="10" name="Picture 9">
-            <a:extLst>
-              <a:ext uri="{FF2B5EF4-FFF2-40B4-BE49-F238E27FC236}">
-                <a16:creationId xmlns:a16="http://schemas.microsoft.com/office/drawing/2014/main" id="{1C388620-2A60-B3C7-FCBD-6E48B81EBA48}"/>
-              </a:ext>
-            </a:extLst>
-          </p:cNvPr>
-          <p:cNvPicPr>
-            <a:picLocks noChangeAspect="1"/>
-          </p:cNvPicPr>
-          <p:nvPr/>
-        </p:nvPicPr>
-        <p:blipFill>
-          <a:blip r:embed="rId5">
-            <a:extLst>
-              <a:ext uri="{28A0092B-C50C-407E-A947-70E740481C1C}">
-                <a14:useLocalDpi xmlns:a14="http://schemas.microsoft.com/office/drawing/2010/main" val="0"/>
-              </a:ext>
-            </a:extLst>
-          </a:blip>
-          <a:stretch>
-            <a:fillRect/>
-          </a:stretch>
-        </p:blipFill>
-        <p:spPr>
-          <a:xfrm>
-            <a:off x="7013141" y="-211166"/>
-            <a:ext cx="5362170" cy="6858000"/>
-          </a:xfrm>
-          <a:prstGeom prst="rect">
-            <a:avLst/>
-          </a:prstGeom>
-        </p:spPr>
-      </p:pic>
-      <p:sp>
-        <p:nvSpPr>
-          <p:cNvPr id="6" name="Freeform: Shape 5">
-            <a:extLst>
-              <a:ext uri="{FF2B5EF4-FFF2-40B4-BE49-F238E27FC236}">
-                <a16:creationId xmlns:a16="http://schemas.microsoft.com/office/drawing/2014/main" id="{71EA2E1C-7061-C7F5-30E0-20C0025D1F76}"/>
-              </a:ext>
-            </a:extLst>
-          </p:cNvPr>
-          <p:cNvSpPr/>
-          <p:nvPr/>
-        </p:nvSpPr>
-        <p:spPr>
-          <a:xfrm>
-            <a:off x="0" y="0"/>
-            <a:ext cx="12192000" cy="6858000"/>
-          </a:xfrm>
-          <a:custGeom>
-            <a:avLst/>
-            <a:gdLst>
-              <a:gd name="connsiteX0" fmla="*/ 904672 w 12192000"/>
-              <a:gd name="connsiteY0" fmla="*/ 3297677 h 6858000"/>
-              <a:gd name="connsiteX1" fmla="*/ 904672 w 12192000"/>
-              <a:gd name="connsiteY1" fmla="*/ 3706238 h 6858000"/>
-              <a:gd name="connsiteX2" fmla="*/ 4114800 w 12192000"/>
-              <a:gd name="connsiteY2" fmla="*/ 3706238 h 6858000"/>
-              <a:gd name="connsiteX3" fmla="*/ 4114800 w 12192000"/>
-              <a:gd name="connsiteY3" fmla="*/ 3297677 h 6858000"/>
-              <a:gd name="connsiteX4" fmla="*/ 0 w 12192000"/>
-              <a:gd name="connsiteY4" fmla="*/ 0 h 6858000"/>
-              <a:gd name="connsiteX5" fmla="*/ 12192000 w 12192000"/>
-              <a:gd name="connsiteY5" fmla="*/ 0 h 6858000"/>
-              <a:gd name="connsiteX6" fmla="*/ 12192000 w 12192000"/>
-              <a:gd name="connsiteY6" fmla="*/ 6858000 h 6858000"/>
-              <a:gd name="connsiteX7" fmla="*/ 0 w 12192000"/>
-              <a:gd name="connsiteY7" fmla="*/ 6858000 h 6858000"/>
-            </a:gdLst>
-            <a:ahLst/>
-            <a:cxnLst>
-              <a:cxn ang="0">
-                <a:pos x="connsiteX0" y="connsiteY0"/>
-              </a:cxn>
-              <a:cxn ang="0">
-                <a:pos x="connsiteX1" y="connsiteY1"/>
-              </a:cxn>
-              <a:cxn ang="0">
-                <a:pos x="connsiteX2" y="connsiteY2"/>
-              </a:cxn>
-              <a:cxn ang="0">
-                <a:pos x="connsiteX3" y="connsiteY3"/>
-              </a:cxn>
-              <a:cxn ang="0">
-                <a:pos x="connsiteX4" y="connsiteY4"/>
-              </a:cxn>
-              <a:cxn ang="0">
-                <a:pos x="connsiteX5" y="connsiteY5"/>
-              </a:cxn>
-              <a:cxn ang="0">
-                <a:pos x="connsiteX6" y="connsiteY6"/>
-              </a:cxn>
-              <a:cxn ang="0">
-                <a:pos x="connsiteX7" y="connsiteY7"/>
-              </a:cxn>
-            </a:cxnLst>
-            <a:rect l="l" t="t" r="r" b="b"/>
-            <a:pathLst>
-              <a:path w="12192000" h="6858000">
-                <a:moveTo>
-                  <a:pt x="904672" y="3297677"/>
-                </a:moveTo>
-                <a:lnTo>
-                  <a:pt x="904672" y="3706238"/>
-                </a:lnTo>
-                <a:lnTo>
-                  <a:pt x="4114800" y="3706238"/>
-                </a:lnTo>
-                <a:lnTo>
-                  <a:pt x="4114800" y="3297677"/>
-                </a:lnTo>
-                <a:close/>
-                <a:moveTo>
-                  <a:pt x="0" y="0"/>
-                </a:moveTo>
-                <a:lnTo>
-                  <a:pt x="12192000" y="0"/>
-                </a:lnTo>
-                <a:lnTo>
-                  <a:pt x="12192000" y="6858000"/>
-                </a:lnTo>
-                <a:lnTo>
-                  <a:pt x="0" y="6858000"/>
-                </a:lnTo>
-                <a:close/>
-              </a:path>
-            </a:pathLst>
-          </a:custGeom>
-          <a:solidFill>
-            <a:schemeClr val="tx1">
-              <a:alpha val="66000"/>
-            </a:schemeClr>
-          </a:solidFill>
-          <a:ln>
-            <a:noFill/>
-          </a:ln>
-        </p:spPr>
-        <p:style>
-          <a:lnRef idx="2">
-            <a:schemeClr val="accent1">
-              <a:shade val="50000"/>
-            </a:schemeClr>
-          </a:lnRef>
-          <a:fillRef idx="1">
-            <a:schemeClr val="accent1"/>
-          </a:fillRef>
-          <a:effectRef idx="0">
-            <a:schemeClr val="accent1"/>
-          </a:effectRef>
-          <a:fontRef idx="minor">
-            <a:schemeClr val="lt1"/>
-          </a:fontRef>
-        </p:style>
-        <p:txBody>
-          <a:bodyPr wrap="square" rtlCol="0" anchor="ctr">
-            <a:noAutofit/>
-          </a:bodyPr>
-          <a:lstStyle/>
-          <a:p>
-            <a:pPr algn="ctr"/>
-            <a:endParaRPr lang="en-IN" dirty="0"/>
-          </a:p>
-        </p:txBody>
-      </p:sp>
-      <p:sp>
-        <p:nvSpPr>
-          <p:cNvPr id="7" name="Rectangle: Rounded Corners 6">
-            <a:extLst>
-              <a:ext uri="{FF2B5EF4-FFF2-40B4-BE49-F238E27FC236}">
-                <a16:creationId xmlns:a16="http://schemas.microsoft.com/office/drawing/2014/main" id="{DB86DBFE-A6C7-280B-658E-D21FE97955C9}"/>
-              </a:ext>
-            </a:extLst>
-          </p:cNvPr>
-          <p:cNvSpPr/>
-          <p:nvPr/>
-        </p:nvSpPr>
-        <p:spPr>
-          <a:xfrm>
-            <a:off x="4263214" y="3036863"/>
-            <a:ext cx="3472963" cy="922497"/>
-          </a:xfrm>
-          <a:prstGeom prst="roundRect">
-            <a:avLst>
-              <a:gd name="adj" fmla="val 29524"/>
-            </a:avLst>
-          </a:prstGeom>
-          <a:noFill/>
-          <a:ln>
-            <a:solidFill>
-              <a:schemeClr val="bg1"/>
-            </a:solidFill>
-          </a:ln>
-        </p:spPr>
-        <p:style>
-          <a:lnRef idx="2">
-            <a:schemeClr val="accent1">
-              <a:shade val="50000"/>
-            </a:schemeClr>
-          </a:lnRef>
-          <a:fillRef idx="1">
-            <a:schemeClr val="accent1"/>
-          </a:fillRef>
-          <a:effectRef idx="0">
-            <a:schemeClr val="accent1"/>
-          </a:effectRef>
-          <a:fontRef idx="minor">
-            <a:schemeClr val="lt1"/>
-          </a:fontRef>
-        </p:style>
-        <p:txBody>
-          <a:bodyPr rtlCol="0" anchor="ctr"/>
-          <a:lstStyle/>
-          <a:p>
-            <a:pPr algn="ctr"/>
-            <a:r>
-              <a:rPr lang="en-US" dirty="0">
-                <a:latin typeface="Fira Code SemiBold" panose="020B0809050000020004" pitchFamily="49" charset="0"/>
-                <a:ea typeface="Fira Code SemiBold" panose="020B0809050000020004" pitchFamily="49" charset="0"/>
-              </a:rPr>
-              <a:t>exec Command</a:t>
-            </a:r>
-          </a:p>
-          <a:p>
-            <a:r>
-              <a:rPr lang="en-US" sz="1200" dirty="0">
-                <a:latin typeface="Fira Code SemiBold" panose="020B0809050000020004" pitchFamily="49" charset="0"/>
-                <a:ea typeface="Fira Code SemiBold" panose="020B0809050000020004" pitchFamily="49" charset="0"/>
-              </a:rPr>
-              <a:t>Here, it changes stdin to the specified file</a:t>
-            </a:r>
-          </a:p>
-        </p:txBody>
-      </p:sp>
-    </p:spTree>
-    <p:extLst>
-      <p:ext uri="{BB962C8B-B14F-4D97-AF65-F5344CB8AC3E}">
-        <p14:creationId xmlns:p14="http://schemas.microsoft.com/office/powerpoint/2010/main" val="1361183141"/>
-      </p:ext>
-    </p:extLst>
-  </p:cSld>
-  <p:clrMapOvr>
-    <a:masterClrMapping/>
-  </p:clrMapOvr>
-  <p:transition>
-    <p:fade/>
-  </p:transition>
-  <p:timing>
-    <p:tnLst>
-      <p:par>
-        <p:cTn id="1" dur="indefinite" restart="never" nodeType="tmRoot">
-          <p:childTnLst>
-            <p:seq concurrent="1" nextAc="seek">
-              <p:cTn id="2" dur="indefinite" nodeType="mainSeq">
-                <p:childTnLst>
-                  <p:par>
-                    <p:cTn id="3" fill="hold">
-                      <p:stCondLst>
-                        <p:cond delay="indefinite"/>
-                        <p:cond evt="onBegin" delay="0">
-                          <p:tn val="2"/>
-                        </p:cond>
-                      </p:stCondLst>
-                      <p:childTnLst>
-                        <p:par>
-                          <p:cTn id="4" fill="hold">
-                            <p:stCondLst>
-                              <p:cond delay="0"/>
-                            </p:stCondLst>
-                            <p:childTnLst>
-                              <p:par>
-                                <p:cTn id="5" presetID="10" presetClass="entr" presetSubtype="0" fill="hold" grpId="0" nodeType="withEffect">
-                                  <p:stCondLst>
-                                    <p:cond delay="0"/>
-                                  </p:stCondLst>
-                                  <p:childTnLst>
-                                    <p:set>
-                                      <p:cBhvr>
-                                        <p:cTn id="6" dur="1" fill="hold">
-                                          <p:stCondLst>
-                                            <p:cond delay="0"/>
-                                          </p:stCondLst>
-                                        </p:cTn>
-                                        <p:tgtEl>
-                                          <p:spTgt spid="7"/>
-                                        </p:tgtEl>
-                                        <p:attrNameLst>
-                                          <p:attrName>style.visibility</p:attrName>
-                                        </p:attrNameLst>
-                                      </p:cBhvr>
-                                      <p:to>
-                                        <p:strVal val="visible"/>
-                                      </p:to>
-                                    </p:set>
-                                    <p:animEffect transition="in" filter="fade">
-                                      <p:cBhvr>
-                                        <p:cTn id="7" dur="500"/>
-                                        <p:tgtEl>
-                                          <p:spTgt spid="7"/>
-                                        </p:tgtEl>
-                                      </p:cBhvr>
-                                    </p:animEffect>
-                                  </p:childTnLst>
-                                </p:cTn>
-                              </p:par>
-                            </p:childTnLst>
-                          </p:cTn>
-                        </p:par>
-                      </p:childTnLst>
-                    </p:cTn>
-                  </p:par>
-                </p:childTnLst>
-              </p:cTn>
-              <p:prevCondLst>
-                <p:cond evt="onPrev" delay="0">
-                  <p:tgtEl>
-                    <p:sldTgt/>
-                  </p:tgtEl>
-                </p:cond>
-              </p:prevCondLst>
-              <p:nextCondLst>
-                <p:cond evt="onNext" delay="0">
-                  <p:tgtEl>
-                    <p:sldTgt/>
-                  </p:tgtEl>
-                </p:cond>
-              </p:nextCondLst>
-            </p:seq>
-          </p:childTnLst>
-        </p:cTn>
-      </p:par>
-    </p:tnLst>
-    <p:bldLst>
-      <p:bldP spid="7" grpId="0" animBg="1"/>
-    </p:bldLst>
-  </p:timing>
 </p:sld>
 </file>
 
@@ -26779,6 +26724,502 @@
       </p:pic>
       <p:sp>
         <p:nvSpPr>
+          <p:cNvPr id="6" name="Freeform: Shape 5">
+            <a:extLst>
+              <a:ext uri="{FF2B5EF4-FFF2-40B4-BE49-F238E27FC236}">
+                <a16:creationId xmlns:a16="http://schemas.microsoft.com/office/drawing/2014/main" id="{71EA2E1C-7061-C7F5-30E0-20C0025D1F76}"/>
+              </a:ext>
+            </a:extLst>
+          </p:cNvPr>
+          <p:cNvSpPr/>
+          <p:nvPr/>
+        </p:nvSpPr>
+        <p:spPr>
+          <a:xfrm>
+            <a:off x="0" y="0"/>
+            <a:ext cx="12192000" cy="6858000"/>
+          </a:xfrm>
+          <a:custGeom>
+            <a:avLst/>
+            <a:gdLst>
+              <a:gd name="connsiteX0" fmla="*/ 904672 w 12192000"/>
+              <a:gd name="connsiteY0" fmla="*/ 3297677 h 6858000"/>
+              <a:gd name="connsiteX1" fmla="*/ 904672 w 12192000"/>
+              <a:gd name="connsiteY1" fmla="*/ 3706238 h 6858000"/>
+              <a:gd name="connsiteX2" fmla="*/ 4114800 w 12192000"/>
+              <a:gd name="connsiteY2" fmla="*/ 3706238 h 6858000"/>
+              <a:gd name="connsiteX3" fmla="*/ 4114800 w 12192000"/>
+              <a:gd name="connsiteY3" fmla="*/ 3297677 h 6858000"/>
+              <a:gd name="connsiteX4" fmla="*/ 0 w 12192000"/>
+              <a:gd name="connsiteY4" fmla="*/ 0 h 6858000"/>
+              <a:gd name="connsiteX5" fmla="*/ 12192000 w 12192000"/>
+              <a:gd name="connsiteY5" fmla="*/ 0 h 6858000"/>
+              <a:gd name="connsiteX6" fmla="*/ 12192000 w 12192000"/>
+              <a:gd name="connsiteY6" fmla="*/ 6858000 h 6858000"/>
+              <a:gd name="connsiteX7" fmla="*/ 0 w 12192000"/>
+              <a:gd name="connsiteY7" fmla="*/ 6858000 h 6858000"/>
+            </a:gdLst>
+            <a:ahLst/>
+            <a:cxnLst>
+              <a:cxn ang="0">
+                <a:pos x="connsiteX0" y="connsiteY0"/>
+              </a:cxn>
+              <a:cxn ang="0">
+                <a:pos x="connsiteX1" y="connsiteY1"/>
+              </a:cxn>
+              <a:cxn ang="0">
+                <a:pos x="connsiteX2" y="connsiteY2"/>
+              </a:cxn>
+              <a:cxn ang="0">
+                <a:pos x="connsiteX3" y="connsiteY3"/>
+              </a:cxn>
+              <a:cxn ang="0">
+                <a:pos x="connsiteX4" y="connsiteY4"/>
+              </a:cxn>
+              <a:cxn ang="0">
+                <a:pos x="connsiteX5" y="connsiteY5"/>
+              </a:cxn>
+              <a:cxn ang="0">
+                <a:pos x="connsiteX6" y="connsiteY6"/>
+              </a:cxn>
+              <a:cxn ang="0">
+                <a:pos x="connsiteX7" y="connsiteY7"/>
+              </a:cxn>
+            </a:cxnLst>
+            <a:rect l="l" t="t" r="r" b="b"/>
+            <a:pathLst>
+              <a:path w="12192000" h="6858000">
+                <a:moveTo>
+                  <a:pt x="904672" y="3297677"/>
+                </a:moveTo>
+                <a:lnTo>
+                  <a:pt x="904672" y="3706238"/>
+                </a:lnTo>
+                <a:lnTo>
+                  <a:pt x="4114800" y="3706238"/>
+                </a:lnTo>
+                <a:lnTo>
+                  <a:pt x="4114800" y="3297677"/>
+                </a:lnTo>
+                <a:close/>
+                <a:moveTo>
+                  <a:pt x="0" y="0"/>
+                </a:moveTo>
+                <a:lnTo>
+                  <a:pt x="12192000" y="0"/>
+                </a:lnTo>
+                <a:lnTo>
+                  <a:pt x="12192000" y="6858000"/>
+                </a:lnTo>
+                <a:lnTo>
+                  <a:pt x="0" y="6858000"/>
+                </a:lnTo>
+                <a:close/>
+              </a:path>
+            </a:pathLst>
+          </a:custGeom>
+          <a:solidFill>
+            <a:schemeClr val="tx1">
+              <a:alpha val="66000"/>
+            </a:schemeClr>
+          </a:solidFill>
+          <a:ln>
+            <a:noFill/>
+          </a:ln>
+        </p:spPr>
+        <p:style>
+          <a:lnRef idx="2">
+            <a:schemeClr val="accent1">
+              <a:shade val="50000"/>
+            </a:schemeClr>
+          </a:lnRef>
+          <a:fillRef idx="1">
+            <a:schemeClr val="accent1"/>
+          </a:fillRef>
+          <a:effectRef idx="0">
+            <a:schemeClr val="accent1"/>
+          </a:effectRef>
+          <a:fontRef idx="minor">
+            <a:schemeClr val="lt1"/>
+          </a:fontRef>
+        </p:style>
+        <p:txBody>
+          <a:bodyPr wrap="square" rtlCol="0" anchor="ctr">
+            <a:noAutofit/>
+          </a:bodyPr>
+          <a:lstStyle/>
+          <a:p>
+            <a:pPr algn="ctr"/>
+            <a:endParaRPr lang="en-IN" dirty="0"/>
+          </a:p>
+        </p:txBody>
+      </p:sp>
+      <p:sp>
+        <p:nvSpPr>
+          <p:cNvPr id="7" name="Rectangle: Rounded Corners 6">
+            <a:extLst>
+              <a:ext uri="{FF2B5EF4-FFF2-40B4-BE49-F238E27FC236}">
+                <a16:creationId xmlns:a16="http://schemas.microsoft.com/office/drawing/2014/main" id="{DB86DBFE-A6C7-280B-658E-D21FE97955C9}"/>
+              </a:ext>
+            </a:extLst>
+          </p:cNvPr>
+          <p:cNvSpPr/>
+          <p:nvPr/>
+        </p:nvSpPr>
+        <p:spPr>
+          <a:xfrm>
+            <a:off x="4263214" y="3036863"/>
+            <a:ext cx="3472963" cy="922497"/>
+          </a:xfrm>
+          <a:prstGeom prst="roundRect">
+            <a:avLst>
+              <a:gd name="adj" fmla="val 29524"/>
+            </a:avLst>
+          </a:prstGeom>
+          <a:noFill/>
+          <a:ln>
+            <a:solidFill>
+              <a:schemeClr val="bg1"/>
+            </a:solidFill>
+          </a:ln>
+        </p:spPr>
+        <p:style>
+          <a:lnRef idx="2">
+            <a:schemeClr val="accent1">
+              <a:shade val="50000"/>
+            </a:schemeClr>
+          </a:lnRef>
+          <a:fillRef idx="1">
+            <a:schemeClr val="accent1"/>
+          </a:fillRef>
+          <a:effectRef idx="0">
+            <a:schemeClr val="accent1"/>
+          </a:effectRef>
+          <a:fontRef idx="minor">
+            <a:schemeClr val="lt1"/>
+          </a:fontRef>
+        </p:style>
+        <p:txBody>
+          <a:bodyPr rtlCol="0" anchor="ctr"/>
+          <a:lstStyle/>
+          <a:p>
+            <a:pPr algn="ctr"/>
+            <a:r>
+              <a:rPr lang="en-US" dirty="0">
+                <a:latin typeface="Fira Code SemiBold" panose="020B0809050000020004" pitchFamily="49" charset="0"/>
+                <a:ea typeface="Fira Code SemiBold" panose="020B0809050000020004" pitchFamily="49" charset="0"/>
+              </a:rPr>
+              <a:t>exec Command</a:t>
+            </a:r>
+          </a:p>
+          <a:p>
+            <a:r>
+              <a:rPr lang="en-US" sz="1200" dirty="0">
+                <a:latin typeface="Fira Code SemiBold" panose="020B0809050000020004" pitchFamily="49" charset="0"/>
+                <a:ea typeface="Fira Code SemiBold" panose="020B0809050000020004" pitchFamily="49" charset="0"/>
+              </a:rPr>
+              <a:t>Here, it changes stdin to the specified file</a:t>
+            </a:r>
+          </a:p>
+        </p:txBody>
+      </p:sp>
+    </p:spTree>
+    <p:extLst>
+      <p:ext uri="{BB962C8B-B14F-4D97-AF65-F5344CB8AC3E}">
+        <p14:creationId xmlns:p14="http://schemas.microsoft.com/office/powerpoint/2010/main" val="1361183141"/>
+      </p:ext>
+    </p:extLst>
+  </p:cSld>
+  <p:clrMapOvr>
+    <a:masterClrMapping/>
+  </p:clrMapOvr>
+  <p:transition>
+    <p:fade/>
+  </p:transition>
+  <p:timing>
+    <p:tnLst>
+      <p:par>
+        <p:cTn id="1" dur="indefinite" restart="never" nodeType="tmRoot">
+          <p:childTnLst>
+            <p:seq concurrent="1" nextAc="seek">
+              <p:cTn id="2" dur="indefinite" nodeType="mainSeq">
+                <p:childTnLst>
+                  <p:par>
+                    <p:cTn id="3" fill="hold">
+                      <p:stCondLst>
+                        <p:cond delay="indefinite"/>
+                        <p:cond evt="onBegin" delay="0">
+                          <p:tn val="2"/>
+                        </p:cond>
+                      </p:stCondLst>
+                      <p:childTnLst>
+                        <p:par>
+                          <p:cTn id="4" fill="hold">
+                            <p:stCondLst>
+                              <p:cond delay="0"/>
+                            </p:stCondLst>
+                            <p:childTnLst>
+                              <p:par>
+                                <p:cTn id="5" presetID="10" presetClass="entr" presetSubtype="0" fill="hold" grpId="0" nodeType="withEffect">
+                                  <p:stCondLst>
+                                    <p:cond delay="0"/>
+                                  </p:stCondLst>
+                                  <p:childTnLst>
+                                    <p:set>
+                                      <p:cBhvr>
+                                        <p:cTn id="6" dur="1" fill="hold">
+                                          <p:stCondLst>
+                                            <p:cond delay="0"/>
+                                          </p:stCondLst>
+                                        </p:cTn>
+                                        <p:tgtEl>
+                                          <p:spTgt spid="7"/>
+                                        </p:tgtEl>
+                                        <p:attrNameLst>
+                                          <p:attrName>style.visibility</p:attrName>
+                                        </p:attrNameLst>
+                                      </p:cBhvr>
+                                      <p:to>
+                                        <p:strVal val="visible"/>
+                                      </p:to>
+                                    </p:set>
+                                    <p:animEffect transition="in" filter="fade">
+                                      <p:cBhvr>
+                                        <p:cTn id="7" dur="500"/>
+                                        <p:tgtEl>
+                                          <p:spTgt spid="7"/>
+                                        </p:tgtEl>
+                                      </p:cBhvr>
+                                    </p:animEffect>
+                                  </p:childTnLst>
+                                </p:cTn>
+                              </p:par>
+                            </p:childTnLst>
+                          </p:cTn>
+                        </p:par>
+                      </p:childTnLst>
+                    </p:cTn>
+                  </p:par>
+                </p:childTnLst>
+              </p:cTn>
+              <p:prevCondLst>
+                <p:cond evt="onPrev" delay="0">
+                  <p:tgtEl>
+                    <p:sldTgt/>
+                  </p:tgtEl>
+                </p:cond>
+              </p:prevCondLst>
+              <p:nextCondLst>
+                <p:cond evt="onNext" delay="0">
+                  <p:tgtEl>
+                    <p:sldTgt/>
+                  </p:tgtEl>
+                </p:cond>
+              </p:nextCondLst>
+            </p:seq>
+          </p:childTnLst>
+        </p:cTn>
+      </p:par>
+    </p:tnLst>
+    <p:bldLst>
+      <p:bldP spid="7" grpId="0" animBg="1"/>
+    </p:bldLst>
+  </p:timing>
+</p:sld>
+</file>
+
+<file path=ppt/slides/slide51.xml><?xml version="1.0" encoding="utf-8"?>
+<p:sld xmlns:a="http://schemas.openxmlformats.org/drawingml/2006/main" xmlns:r="http://schemas.openxmlformats.org/officeDocument/2006/relationships" xmlns:p="http://schemas.openxmlformats.org/presentationml/2006/main" show="0">
+  <p:cSld>
+    <p:bg>
+      <p:bgPr>
+        <a:blipFill dpi="0" rotWithShape="1">
+          <a:blip r:embed="rId3">
+            <a:lum/>
+          </a:blip>
+          <a:srcRect/>
+          <a:stretch>
+            <a:fillRect t="-9000" b="-9000"/>
+          </a:stretch>
+        </a:blipFill>
+        <a:effectLst/>
+      </p:bgPr>
+    </p:bg>
+    <p:spTree>
+      <p:nvGrpSpPr>
+        <p:cNvPr id="1" name=""/>
+        <p:cNvGrpSpPr/>
+        <p:nvPr/>
+      </p:nvGrpSpPr>
+      <p:grpSpPr>
+        <a:xfrm>
+          <a:off x="0" y="0"/>
+          <a:ext cx="0" cy="0"/>
+          <a:chOff x="0" y="0"/>
+          <a:chExt cx="0" cy="0"/>
+        </a:xfrm>
+      </p:grpSpPr>
+      <p:sp>
+        <p:nvSpPr>
+          <p:cNvPr id="2" name="Rectangle 1">
+            <a:extLst>
+              <a:ext uri="{FF2B5EF4-FFF2-40B4-BE49-F238E27FC236}">
+                <a16:creationId xmlns:a16="http://schemas.microsoft.com/office/drawing/2014/main" id="{E519822D-3C02-FE88-8748-DC75115DA964}"/>
+              </a:ext>
+            </a:extLst>
+          </p:cNvPr>
+          <p:cNvSpPr/>
+          <p:nvPr/>
+        </p:nvSpPr>
+        <p:spPr>
+          <a:xfrm>
+            <a:off x="118857" y="94434"/>
+            <a:ext cx="5750292" cy="1446550"/>
+          </a:xfrm>
+          <a:prstGeom prst="rect">
+            <a:avLst/>
+          </a:prstGeom>
+          <a:noFill/>
+        </p:spPr>
+        <p:txBody>
+          <a:bodyPr wrap="none" lIns="91440" tIns="45720" rIns="91440" bIns="45720">
+            <a:spAutoFit/>
+          </a:bodyPr>
+          <a:lstStyle/>
+          <a:p>
+            <a:r>
+              <a:rPr lang="en-US" sz="4400" dirty="0">
+                <a:ln w="0"/>
+                <a:solidFill>
+                  <a:schemeClr val="bg1"/>
+                </a:solidFill>
+                <a:effectLst>
+                  <a:outerShdw blurRad="38100" dist="19050" dir="2700000" algn="tl" rotWithShape="0">
+                    <a:schemeClr val="dk1">
+                      <a:alpha val="40000"/>
+                    </a:schemeClr>
+                  </a:outerShdw>
+                </a:effectLst>
+                <a:latin typeface="Fira Code SemiBold" panose="020B0809050000020004" pitchFamily="49" charset="0"/>
+                <a:ea typeface="Fira Code SemiBold" panose="020B0809050000020004" pitchFamily="49" charset="0"/>
+              </a:rPr>
+              <a:t>Another method</a:t>
+            </a:r>
+          </a:p>
+          <a:p>
+            <a:r>
+              <a:rPr lang="en-US" sz="4400" dirty="0">
+                <a:ln w="0"/>
+                <a:solidFill>
+                  <a:schemeClr val="bg1"/>
+                </a:solidFill>
+                <a:effectLst>
+                  <a:outerShdw blurRad="38100" dist="19050" dir="2700000" algn="tl" rotWithShape="0">
+                    <a:schemeClr val="dk1">
+                      <a:alpha val="40000"/>
+                    </a:schemeClr>
+                  </a:outerShdw>
+                </a:effectLst>
+                <a:latin typeface="Fira Code SemiBold" panose="020B0809050000020004" pitchFamily="49" charset="0"/>
+                <a:ea typeface="Fira Code SemiBold" panose="020B0809050000020004" pitchFamily="49" charset="0"/>
+              </a:rPr>
+              <a:t>to </a:t>
+            </a:r>
+            <a:r>
+              <a:rPr lang="en-US" sz="4400" b="0" cap="none" spc="0" dirty="0">
+                <a:ln w="0"/>
+                <a:solidFill>
+                  <a:schemeClr val="bg1"/>
+                </a:solidFill>
+                <a:effectLst>
+                  <a:outerShdw blurRad="38100" dist="19050" dir="2700000" algn="tl" rotWithShape="0">
+                    <a:schemeClr val="dk1">
+                      <a:alpha val="40000"/>
+                    </a:schemeClr>
+                  </a:outerShdw>
+                </a:effectLst>
+                <a:latin typeface="Fira Code SemiBold" panose="020B0809050000020004" pitchFamily="49" charset="0"/>
+                <a:ea typeface="Fira Code SemiBold" panose="020B0809050000020004" pitchFamily="49" charset="0"/>
+              </a:rPr>
+              <a:t>ignore Header</a:t>
+            </a:r>
+          </a:p>
+        </p:txBody>
+      </p:sp>
+      <p:pic>
+        <p:nvPicPr>
+          <p:cNvPr id="5" name="Picture 4">
+            <a:extLst>
+              <a:ext uri="{FF2B5EF4-FFF2-40B4-BE49-F238E27FC236}">
+                <a16:creationId xmlns:a16="http://schemas.microsoft.com/office/drawing/2014/main" id="{EB1CA123-E2EE-9BC1-DD8E-1952AB6C4EDD}"/>
+              </a:ext>
+            </a:extLst>
+          </p:cNvPr>
+          <p:cNvPicPr>
+            <a:picLocks noChangeAspect="1"/>
+          </p:cNvPicPr>
+          <p:nvPr/>
+        </p:nvPicPr>
+        <p:blipFill>
+          <a:blip r:embed="rId4">
+            <a:extLst>
+              <a:ext uri="{28A0092B-C50C-407E-A947-70E740481C1C}">
+                <a14:useLocalDpi xmlns:a14="http://schemas.microsoft.com/office/drawing/2010/main" val="0"/>
+              </a:ext>
+            </a:extLst>
+          </a:blip>
+          <a:stretch>
+            <a:fillRect/>
+          </a:stretch>
+        </p:blipFill>
+        <p:spPr>
+          <a:xfrm>
+            <a:off x="-413628" y="535427"/>
+            <a:ext cx="8058150" cy="6419850"/>
+          </a:xfrm>
+          <a:prstGeom prst="rect">
+            <a:avLst/>
+          </a:prstGeom>
+        </p:spPr>
+      </p:pic>
+      <p:pic>
+        <p:nvPicPr>
+          <p:cNvPr id="10" name="Picture 9">
+            <a:extLst>
+              <a:ext uri="{FF2B5EF4-FFF2-40B4-BE49-F238E27FC236}">
+                <a16:creationId xmlns:a16="http://schemas.microsoft.com/office/drawing/2014/main" id="{1C388620-2A60-B3C7-FCBD-6E48B81EBA48}"/>
+              </a:ext>
+            </a:extLst>
+          </p:cNvPr>
+          <p:cNvPicPr>
+            <a:picLocks noChangeAspect="1"/>
+          </p:cNvPicPr>
+          <p:nvPr/>
+        </p:nvPicPr>
+        <p:blipFill>
+          <a:blip r:embed="rId5">
+            <a:extLst>
+              <a:ext uri="{28A0092B-C50C-407E-A947-70E740481C1C}">
+                <a14:useLocalDpi xmlns:a14="http://schemas.microsoft.com/office/drawing/2010/main" val="0"/>
+              </a:ext>
+            </a:extLst>
+          </a:blip>
+          <a:stretch>
+            <a:fillRect/>
+          </a:stretch>
+        </p:blipFill>
+        <p:spPr>
+          <a:xfrm>
+            <a:off x="7013141" y="-211166"/>
+            <a:ext cx="5362170" cy="6858000"/>
+          </a:xfrm>
+          <a:prstGeom prst="rect">
+            <a:avLst/>
+          </a:prstGeom>
+        </p:spPr>
+      </p:pic>
+      <p:sp>
+        <p:nvSpPr>
           <p:cNvPr id="4" name="Freeform: Shape 3">
             <a:extLst>
               <a:ext uri="{FF2B5EF4-FFF2-40B4-BE49-F238E27FC236}">
@@ -27211,7 +27652,7 @@
 </p:sld>
 </file>
 
-<file path=ppt/slides/slide51.xml><?xml version="1.0" encoding="utf-8"?>
+<file path=ppt/slides/slide52.xml><?xml version="1.0" encoding="utf-8"?>
 <p:sld xmlns:a="http://schemas.openxmlformats.org/drawingml/2006/main" xmlns:r="http://schemas.openxmlformats.org/officeDocument/2006/relationships" xmlns:p="http://schemas.openxmlformats.org/presentationml/2006/main" show="0">
   <p:cSld>
     <p:bg>
@@ -27879,7 +28320,7 @@
 </p:sld>
 </file>
 
-<file path=ppt/slides/slide52.xml><?xml version="1.0" encoding="utf-8"?>
+<file path=ppt/slides/slide53.xml><?xml version="1.0" encoding="utf-8"?>
 <p:sld xmlns:a="http://schemas.openxmlformats.org/drawingml/2006/main" xmlns:r="http://schemas.openxmlformats.org/officeDocument/2006/relationships" xmlns:p="http://schemas.openxmlformats.org/presentationml/2006/main" show="0">
   <p:cSld>
     <p:bg>
@@ -28350,7 +28791,7 @@
 </p:sld>
 </file>
 
-<file path=ppt/slides/slide53.xml><?xml version="1.0" encoding="utf-8"?>
+<file path=ppt/slides/slide54.xml><?xml version="1.0" encoding="utf-8"?>
 <p:sld xmlns:a="http://schemas.openxmlformats.org/drawingml/2006/main" xmlns:r="http://schemas.openxmlformats.org/officeDocument/2006/relationships" xmlns:p="http://schemas.openxmlformats.org/presentationml/2006/main">
   <p:cSld>
     <p:spTree>

</xml_diff>